<commit_message>
Revise Presentation and Release Plan
Final drafts for power-point presentation and release plan.
</commit_message>
<xml_diff>
--- a/CS115 LF Presentation.pptx
+++ b/CS115 LF Presentation.pptx
@@ -13,6 +13,7 @@
     <p:sldId id="258" r:id="rId8"/>
     <p:sldId id="259" r:id="rId9"/>
     <p:sldId id="260" r:id="rId10"/>
+    <p:sldId id="261" r:id="rId11"/>
   </p:sldIdLst>
   <p:sldSz cy="5143500" cx="9144000"/>
   <p:notesSz cy="9144000" cx="6858000"/>
@@ -778,16 +779,228 @@
           </a:bodyPr>
           <a:lstStyle/>
           <a:p>
-            <a:pPr>
-              <a:spcBef>
-                <a:spcPts val="0"/>
-              </a:spcBef>
+            <a:pPr rtl="0" lvl="0">
+              <a:lnSpc>
+                <a:spcPct val="115000"/>
+              </a:lnSpc>
+              <a:spcBef>
+                <a:spcPts val="800"/>
+              </a:spcBef>
+              <a:buClr>
+                <a:schemeClr val="dk1"/>
+              </a:buClr>
+              <a:buSzPct val="91666"/>
+              <a:buFont typeface="Arial"/>
               <a:buNone/>
             </a:pPr>
             <a:r>
-              <a:t/>
+              <a:rPr b="1" sz="1200" lang="en">
+                <a:solidFill>
+                  <a:schemeClr val="dk1"/>
+                </a:solidFill>
+              </a:rPr>
+              <a:t>Sprint 1 </a:t>
             </a:r>
-            <a:endParaRPr/>
+            <a:r>
+              <a:rPr sz="1200" lang="en">
+                <a:solidFill>
+                  <a:schemeClr val="dk1"/>
+                </a:solidFill>
+              </a:rPr>
+              <a:t> </a:t>
+            </a:r>
+          </a:p>
+          <a:p>
+            <a:pPr rtl="0" lvl="0">
+              <a:lnSpc>
+                <a:spcPct val="115000"/>
+              </a:lnSpc>
+              <a:spcBef>
+                <a:spcPts val="800"/>
+              </a:spcBef>
+              <a:buClr>
+                <a:schemeClr val="dk1"/>
+              </a:buClr>
+              <a:buSzPct val="84615"/>
+              <a:buFont typeface="Arial"/>
+              <a:buNone/>
+            </a:pPr>
+            <a:r>
+              <a:rPr sz="1300" lang="en">
+                <a:solidFill>
+                  <a:schemeClr val="dk1"/>
+                </a:solidFill>
+              </a:rPr>
+              <a:t>(5 SP) As a player, I want to play a basic level so I can have fun.</a:t>
+            </a:r>
+          </a:p>
+          <a:p>
+            <a:pPr rtl="0" lvl="0">
+              <a:lnSpc>
+                <a:spcPct val="115000"/>
+              </a:lnSpc>
+              <a:spcBef>
+                <a:spcPts val="800"/>
+              </a:spcBef>
+              <a:buClr>
+                <a:schemeClr val="dk1"/>
+              </a:buClr>
+              <a:buSzPct val="84615"/>
+              <a:buFont typeface="Arial"/>
+              <a:buNone/>
+            </a:pPr>
+            <a:r>
+              <a:rPr sz="1300" lang="en" i="1">
+                <a:solidFill>
+                  <a:schemeClr val="dk1"/>
+                </a:solidFill>
+              </a:rPr>
+              <a:t>High level goal:  Level Progression</a:t>
+            </a:r>
+          </a:p>
+          <a:p>
+            <a:pPr rtl="0" lvl="0">
+              <a:lnSpc>
+                <a:spcPct val="115000"/>
+              </a:lnSpc>
+              <a:spcBef>
+                <a:spcPts val="800"/>
+              </a:spcBef>
+              <a:buClr>
+                <a:schemeClr val="dk1"/>
+              </a:buClr>
+              <a:buSzPct val="84615"/>
+              <a:buFont typeface="Arial"/>
+              <a:buNone/>
+            </a:pPr>
+            <a:r>
+              <a:rPr sz="1300" lang="en">
+                <a:solidFill>
+                  <a:schemeClr val="dk1"/>
+                </a:solidFill>
+              </a:rPr>
+              <a:t>(3 SP) As a player, I need guidance on how to play so I can learn the controls.</a:t>
+            </a:r>
+          </a:p>
+          <a:p>
+            <a:pPr rtl="0" lvl="0">
+              <a:lnSpc>
+                <a:spcPct val="115000"/>
+              </a:lnSpc>
+              <a:spcBef>
+                <a:spcPts val="800"/>
+              </a:spcBef>
+              <a:buClr>
+                <a:schemeClr val="dk1"/>
+              </a:buClr>
+              <a:buSzPct val="84615"/>
+              <a:buFont typeface="Arial"/>
+              <a:buNone/>
+            </a:pPr>
+            <a:r>
+              <a:rPr sz="1300" lang="en" i="1">
+                <a:solidFill>
+                  <a:schemeClr val="dk1"/>
+                </a:solidFill>
+              </a:rPr>
+              <a:t>HLG:  Test driven code implementation (Game playtesting, concept and application) and get feedback</a:t>
+            </a:r>
+          </a:p>
+          <a:p>
+            <a:pPr rtl="0" lvl="0">
+              <a:lnSpc>
+                <a:spcPct val="115000"/>
+              </a:lnSpc>
+              <a:spcBef>
+                <a:spcPts val="800"/>
+              </a:spcBef>
+              <a:buClr>
+                <a:schemeClr val="dk1"/>
+              </a:buClr>
+              <a:buSzPct val="84615"/>
+              <a:buFont typeface="Arial"/>
+              <a:buNone/>
+            </a:pPr>
+            <a:r>
+              <a:rPr sz="1300" lang="en">
+                <a:solidFill>
+                  <a:schemeClr val="dk1"/>
+                </a:solidFill>
+              </a:rPr>
+              <a:t>(2 SP) User Story 1: As a product owner, I need to set up an integration system for the team so we can collaborate.</a:t>
+            </a:r>
+          </a:p>
+          <a:p>
+            <a:pPr rtl="0" lvl="0">
+              <a:lnSpc>
+                <a:spcPct val="115000"/>
+              </a:lnSpc>
+              <a:spcBef>
+                <a:spcPts val="800"/>
+              </a:spcBef>
+              <a:buClr>
+                <a:schemeClr val="dk1"/>
+              </a:buClr>
+              <a:buSzPct val="84615"/>
+              <a:buFont typeface="Arial"/>
+              <a:buNone/>
+            </a:pPr>
+            <a:r>
+              <a:rPr sz="1300" lang="en" i="1">
+                <a:solidFill>
+                  <a:schemeClr val="dk1"/>
+                </a:solidFill>
+              </a:rPr>
+              <a:t>HLG: Continuous integration using Git.</a:t>
+            </a:r>
+          </a:p>
+          <a:p>
+            <a:pPr rtl="0" lvl="0">
+              <a:lnSpc>
+                <a:spcPct val="115000"/>
+              </a:lnSpc>
+              <a:spcBef>
+                <a:spcPts val="800"/>
+              </a:spcBef>
+              <a:buClr>
+                <a:schemeClr val="dk1"/>
+              </a:buClr>
+              <a:buSzPct val="84615"/>
+              <a:buFont typeface="Arial"/>
+              <a:buNone/>
+            </a:pPr>
+            <a:r>
+              <a:rPr sz="1300" lang="en">
+                <a:solidFill>
+                  <a:schemeClr val="dk1"/>
+                </a:solidFill>
+              </a:rPr>
+              <a:t>(8 SP) User Story 2: As a product owner, I want to prototype the game and so I can learn about user interaction.</a:t>
+            </a:r>
+          </a:p>
+          <a:p>
+            <a:pPr lvl="0">
+              <a:lnSpc>
+                <a:spcPct val="115000"/>
+              </a:lnSpc>
+              <a:spcBef>
+                <a:spcPts val="800"/>
+              </a:spcBef>
+              <a:buClr>
+                <a:schemeClr val="dk1"/>
+              </a:buClr>
+              <a:buSzPct val="84615"/>
+              <a:buFont typeface="Arial"/>
+              <a:buNone/>
+            </a:pPr>
+            <a:r>
+              <a:rPr sz="1300" lang="en" i="1">
+                <a:solidFill>
+                  <a:schemeClr val="dk1"/>
+                </a:solidFill>
+              </a:rPr>
+              <a:t>HLG: Prototype testing</a:t>
+            </a:r>
           </a:p>
         </p:txBody>
       </p:sp>
@@ -893,6 +1106,275 @@
               <a:t/>
             </a:r>
             <a:endParaRPr/>
+          </a:p>
+        </p:txBody>
+      </p:sp>
+    </p:spTree>
+  </p:cSld>
+  <p:clrMapOvr>
+    <a:masterClrMapping/>
+  </p:clrMapOvr>
+</p:notes>
+</file>
+
+<file path=ppt/notesSlides/notesSlide6.xml><?xml version="1.0" encoding="utf-8"?>
+<p:notes xmlns:a="http://schemas.openxmlformats.org/drawingml/2006/main" xmlns:r="http://schemas.openxmlformats.org/officeDocument/2006/relationships" xmlns:mc="http://schemas.openxmlformats.org/markup-compatibility/2006" xmlns:mv="urn:schemas-microsoft-com:mac:vml" xmlns:p="http://schemas.openxmlformats.org/presentationml/2006/main" xmlns:c="http://schemas.openxmlformats.org/drawingml/2006/chart" xmlns:dgm="http://schemas.openxmlformats.org/drawingml/2006/diagram" xmlns:o="urn:schemas-microsoft-com:office:office" xmlns:v="urn:schemas-microsoft-com:vml" xmlns:pvml="urn:schemas-microsoft-com:office:powerpoint" xmlns:com="http://schemas.openxmlformats.org/drawingml/2006/compatibility" xmlns:p14="http://schemas.microsoft.com/office/powerpoint/2010/main" showMasterSp="0" showMasterPhAnim="0">
+  <p:cSld>
+    <p:spTree>
+      <p:nvGrpSpPr>
+        <p:cNvPr id="105" name="Shape 105"/>
+        <p:cNvGrpSpPr/>
+        <p:nvPr/>
+      </p:nvGrpSpPr>
+      <p:grpSpPr>
+        <a:xfrm>
+          <a:off y="0" x="0"/>
+          <a:ext cy="0" cx="0"/>
+          <a:chOff y="0" x="0"/>
+          <a:chExt cy="0" cx="0"/>
+        </a:xfrm>
+      </p:grpSpPr>
+      <p:sp>
+        <p:nvSpPr>
+          <p:cNvPr id="106" name="Shape 106"/>
+          <p:cNvSpPr/>
+          <p:nvPr>
+            <p:ph idx="2" type="sldImg"/>
+          </p:nvPr>
+        </p:nvSpPr>
+        <p:spPr>
+          <a:xfrm>
+            <a:off y="685800" x="381187"/>
+            <a:ext cy="3429000" cx="6096299"/>
+          </a:xfrm>
+          <a:custGeom>
+            <a:pathLst>
+              <a:path w="120000" extrusionOk="0" h="120000">
+                <a:moveTo>
+                  <a:pt y="0" x="0"/>
+                </a:moveTo>
+                <a:lnTo>
+                  <a:pt y="0" x="120000"/>
+                </a:lnTo>
+                <a:lnTo>
+                  <a:pt y="120000" x="120000"/>
+                </a:lnTo>
+                <a:lnTo>
+                  <a:pt y="120000" x="0"/>
+                </a:lnTo>
+                <a:close/>
+              </a:path>
+            </a:pathLst>
+          </a:custGeom>
+          <a:noFill/>
+          <a:ln w="9525" cap="flat">
+            <a:solidFill>
+              <a:srgbClr val="000000"/>
+            </a:solidFill>
+            <a:prstDash val="solid"/>
+            <a:round/>
+            <a:headEnd w="med" len="med" type="none"/>
+            <a:tailEnd w="med" len="med" type="none"/>
+          </a:ln>
+        </p:spPr>
+      </p:sp>
+      <p:sp>
+        <p:nvSpPr>
+          <p:cNvPr id="107" name="Shape 107"/>
+          <p:cNvSpPr txBox="1"/>
+          <p:nvPr>
+            <p:ph idx="1" type="body"/>
+          </p:nvPr>
+        </p:nvSpPr>
+        <p:spPr>
+          <a:xfrm>
+            <a:off y="4343400" x="685800"/>
+            <a:ext cy="4114800" cx="5486399"/>
+          </a:xfrm>
+          <a:prstGeom prst="rect">
+            <a:avLst/>
+          </a:prstGeom>
+        </p:spPr>
+        <p:txBody>
+          <a:bodyPr bIns="91425" rIns="91425" lIns="91425" tIns="91425" anchor="t" anchorCtr="0">
+            <a:noAutofit/>
+          </a:bodyPr>
+          <a:lstStyle/>
+          <a:p>
+            <a:pPr rtl="0" lvl="0">
+              <a:lnSpc>
+                <a:spcPct val="125454"/>
+              </a:lnSpc>
+              <a:spcBef>
+                <a:spcPts val="0"/>
+              </a:spcBef>
+              <a:buClr>
+                <a:schemeClr val="dk1"/>
+              </a:buClr>
+              <a:buSzPct val="100000"/>
+              <a:buFont typeface="Arial"/>
+              <a:buNone/>
+            </a:pPr>
+            <a:r>
+              <a:rPr b="1" lang="en">
+                <a:solidFill>
+                  <a:schemeClr val="dk1"/>
+                </a:solidFill>
+              </a:rPr>
+              <a:t>Sprint 3</a:t>
+            </a:r>
+            <a:r>
+              <a:rPr lang="en">
+                <a:solidFill>
+                  <a:schemeClr val="dk1"/>
+                </a:solidFill>
+              </a:rPr>
+              <a:t> </a:t>
+            </a:r>
+          </a:p>
+          <a:p>
+            <a:pPr rtl="0" lvl="0">
+              <a:lnSpc>
+                <a:spcPct val="115000"/>
+              </a:lnSpc>
+              <a:spcBef>
+                <a:spcPts val="800"/>
+              </a:spcBef>
+              <a:buClr>
+                <a:schemeClr val="dk1"/>
+              </a:buClr>
+              <a:buSzPct val="110000"/>
+              <a:buFont typeface="Arial"/>
+              <a:buNone/>
+            </a:pPr>
+            <a:r>
+              <a:rPr sz="1000" lang="en">
+                <a:solidFill>
+                  <a:schemeClr val="dk1"/>
+                </a:solidFill>
+              </a:rPr>
+              <a:t>(5 SP) As a player, I want an addicting game that saves my play state so I can return to it later.</a:t>
+            </a:r>
+          </a:p>
+          <a:p>
+            <a:pPr rtl="0" lvl="0">
+              <a:lnSpc>
+                <a:spcPct val="115000"/>
+              </a:lnSpc>
+              <a:spcBef>
+                <a:spcPts val="800"/>
+              </a:spcBef>
+              <a:buClr>
+                <a:schemeClr val="dk1"/>
+              </a:buClr>
+              <a:buSzPct val="110000"/>
+              <a:buFont typeface="Arial"/>
+              <a:buNone/>
+            </a:pPr>
+            <a:r>
+              <a:rPr sz="1000" lang="en" i="1">
+                <a:solidFill>
+                  <a:schemeClr val="dk1"/>
+                </a:solidFill>
+              </a:rPr>
+              <a:t>HLG:  Test driven code implementation (Game playtesting, concept and application) </a:t>
+            </a:r>
+          </a:p>
+          <a:p>
+            <a:pPr rtl="0" lvl="0">
+              <a:lnSpc>
+                <a:spcPct val="115000"/>
+              </a:lnSpc>
+              <a:spcBef>
+                <a:spcPts val="800"/>
+              </a:spcBef>
+              <a:buClr>
+                <a:schemeClr val="dk1"/>
+              </a:buClr>
+              <a:buSzPct val="110000"/>
+              <a:buFont typeface="Arial"/>
+              <a:buNone/>
+            </a:pPr>
+            <a:r>
+              <a:rPr sz="1000" lang="en">
+                <a:solidFill>
+                  <a:schemeClr val="dk1"/>
+                </a:solidFill>
+              </a:rPr>
+              <a:t>(8 SP) As a player, I want to be able to play this game on my phone or tablet so I can play on the go.</a:t>
+            </a:r>
+          </a:p>
+          <a:p>
+            <a:pPr rtl="0" lvl="0">
+              <a:lnSpc>
+                <a:spcPct val="115000"/>
+              </a:lnSpc>
+              <a:spcBef>
+                <a:spcPts val="800"/>
+              </a:spcBef>
+              <a:buClr>
+                <a:schemeClr val="dk1"/>
+              </a:buClr>
+              <a:buSzPct val="110000"/>
+              <a:buFont typeface="Arial"/>
+              <a:buNone/>
+            </a:pPr>
+            <a:r>
+              <a:rPr sz="1000" lang="en" i="1">
+                <a:solidFill>
+                  <a:schemeClr val="dk1"/>
+                </a:solidFill>
+              </a:rPr>
+              <a:t>HLG: Available to play games on different platforms</a:t>
+            </a:r>
+          </a:p>
+          <a:p>
+            <a:pPr rtl="0" lvl="0">
+              <a:lnSpc>
+                <a:spcPct val="115000"/>
+              </a:lnSpc>
+              <a:spcBef>
+                <a:spcPts val="800"/>
+              </a:spcBef>
+              <a:buClr>
+                <a:schemeClr val="dk1"/>
+              </a:buClr>
+              <a:buSzPct val="110000"/>
+              <a:buFont typeface="Arial"/>
+              <a:buNone/>
+            </a:pPr>
+            <a:r>
+              <a:rPr sz="1000" lang="en">
+                <a:solidFill>
+                  <a:schemeClr val="dk1"/>
+                </a:solidFill>
+              </a:rPr>
+              <a:t>(3 SP) As a player, I want the puzzles to show solutions so that when I am stumped I can continue to the next level.</a:t>
+            </a:r>
+          </a:p>
+          <a:p>
+            <a:pPr lvl="0">
+              <a:lnSpc>
+                <a:spcPct val="115000"/>
+              </a:lnSpc>
+              <a:spcBef>
+                <a:spcPts val="800"/>
+              </a:spcBef>
+              <a:buClr>
+                <a:schemeClr val="dk1"/>
+              </a:buClr>
+              <a:buSzPct val="110000"/>
+              <a:buFont typeface="Arial"/>
+              <a:buNone/>
+            </a:pPr>
+            <a:r>
+              <a:rPr sz="1000" lang="en" i="1">
+                <a:solidFill>
+                  <a:schemeClr val="dk1"/>
+                </a:solidFill>
+              </a:rPr>
+              <a:t>HLG:  Get feedback and suggestions from users/players</a:t>
+            </a:r>
           </a:p>
         </p:txBody>
       </p:sp>
@@ -4917,7 +5399,7 @@
                   <a:srgbClr val="000000"/>
                 </a:solidFill>
               </a:rPr>
-              <a:t>Puzzle Dots </a:t>
+              <a:t>Working Title: Puzzle Dots </a:t>
             </a:r>
           </a:p>
         </p:txBody>
@@ -5179,7 +5661,62 @@
                 <a:cs typeface="Arial"/>
                 <a:sym typeface="Arial"/>
               </a:rPr>
-              <a:t>A puzzle game written in C++ about directing the behavior of dots. Game offers short levels with varying complexity and replayability through finding improved solutions.</a:t>
+              <a:t>A puzzle game made in HTML5 with Javascript about directing the behavior of dots. </a:t>
+            </a:r>
+          </a:p>
+          <a:p>
+            <a:pPr rtl="0" lvl="0">
+              <a:lnSpc>
+                <a:spcPct val="115000"/>
+              </a:lnSpc>
+              <a:spcBef>
+                <a:spcPts val="800"/>
+              </a:spcBef>
+              <a:buClr>
+                <a:schemeClr val="dk1"/>
+              </a:buClr>
+              <a:buFont typeface="Arial"/>
+              <a:buNone/>
+            </a:pPr>
+            <a:r>
+              <a:t/>
+            </a:r>
+            <a:endParaRPr sz="2400">
+              <a:solidFill>
+                <a:schemeClr val="dk1"/>
+              </a:solidFill>
+              <a:latin typeface="Arial"/>
+              <a:ea typeface="Arial"/>
+              <a:cs typeface="Arial"/>
+              <a:sym typeface="Arial"/>
+            </a:endParaRPr>
+          </a:p>
+          <a:p>
+            <a:pPr rtl="0" lvl="0">
+              <a:lnSpc>
+                <a:spcPct val="115000"/>
+              </a:lnSpc>
+              <a:spcBef>
+                <a:spcPts val="800"/>
+              </a:spcBef>
+              <a:buClr>
+                <a:schemeClr val="dk1"/>
+              </a:buClr>
+              <a:buSzPct val="45833"/>
+              <a:buFont typeface="Arial"/>
+              <a:buNone/>
+            </a:pPr>
+            <a:r>
+              <a:rPr sz="2400" lang="en">
+                <a:solidFill>
+                  <a:schemeClr val="dk1"/>
+                </a:solidFill>
+                <a:latin typeface="Arial"/>
+                <a:ea typeface="Arial"/>
+                <a:cs typeface="Arial"/>
+                <a:sym typeface="Arial"/>
+              </a:rPr>
+              <a:t>The game offers short levels with varying complexity and replayability through finding improved solutions.</a:t>
             </a:r>
           </a:p>
           <a:p>
@@ -5576,294 +6113,335 @@
           </a:p>
         </p:txBody>
       </p:sp>
-      <p:sp>
-        <p:nvSpPr>
+      <p:graphicFrame>
+        <p:nvGraphicFramePr>
           <p:cNvPr id="92" name="Shape 92"/>
-          <p:cNvSpPr txBox="1"/>
-          <p:nvPr>
-            <p:ph idx="1" type="body"/>
-          </p:nvPr>
-        </p:nvSpPr>
-        <p:spPr>
-          <a:xfrm>
-            <a:off y="1200150" x="457200"/>
-            <a:ext cy="3725699" cx="8229600"/>
-          </a:xfrm>
-          <a:prstGeom prst="rect">
-            <a:avLst/>
-          </a:prstGeom>
-        </p:spPr>
-        <p:txBody>
-          <a:bodyPr bIns="91425" rIns="91425" lIns="91425" tIns="91425" anchor="t" anchorCtr="0">
-            <a:noAutofit/>
-          </a:bodyPr>
-          <a:lstStyle/>
-          <a:p>
-            <a:pPr rtl="0" lvl="0">
-              <a:lnSpc>
-                <a:spcPct val="115000"/>
-              </a:lnSpc>
-              <a:spcBef>
-                <a:spcPts val="800"/>
-              </a:spcBef>
-              <a:buClr>
-                <a:schemeClr val="dk1"/>
-              </a:buClr>
-              <a:buSzPct val="91666"/>
-              <a:buFont typeface="Arial"/>
-              <a:buNone/>
-            </a:pPr>
-            <a:r>
-              <a:rPr b="1" sz="1200" lang="en">
-                <a:solidFill>
-                  <a:schemeClr val="dk1"/>
-                </a:solidFill>
-                <a:latin typeface="Arial"/>
-                <a:ea typeface="Arial"/>
-                <a:cs typeface="Arial"/>
-                <a:sym typeface="Arial"/>
-              </a:rPr>
-              <a:t>Sprint 1 </a:t>
-            </a:r>
-            <a:r>
-              <a:rPr sz="1200" lang="en">
-                <a:solidFill>
-                  <a:schemeClr val="dk1"/>
-                </a:solidFill>
-                <a:latin typeface="Arial"/>
-                <a:ea typeface="Arial"/>
-                <a:cs typeface="Arial"/>
-                <a:sym typeface="Arial"/>
-              </a:rPr>
-              <a:t> </a:t>
-            </a:r>
-          </a:p>
-          <a:p>
-            <a:pPr rtl="0" lvl="0">
-              <a:lnSpc>
-                <a:spcPct val="115000"/>
-              </a:lnSpc>
-              <a:spcBef>
-                <a:spcPts val="800"/>
-              </a:spcBef>
-              <a:buClr>
-                <a:schemeClr val="dk1"/>
-              </a:buClr>
-              <a:buSzPct val="84615"/>
-              <a:buFont typeface="Arial"/>
-              <a:buNone/>
-            </a:pPr>
-            <a:r>
-              <a:rPr sz="1300" lang="en">
-                <a:solidFill>
-                  <a:schemeClr val="dk1"/>
-                </a:solidFill>
-                <a:latin typeface="Arial"/>
-                <a:ea typeface="Arial"/>
-                <a:cs typeface="Arial"/>
-                <a:sym typeface="Arial"/>
-              </a:rPr>
-              <a:t>(5 SP) As a player, I want to play a basic level so I can have fun.</a:t>
-            </a:r>
-          </a:p>
-          <a:p>
-            <a:pPr rtl="0" lvl="0">
-              <a:lnSpc>
-                <a:spcPct val="115000"/>
-              </a:lnSpc>
-              <a:spcBef>
-                <a:spcPts val="800"/>
-              </a:spcBef>
-              <a:buClr>
-                <a:schemeClr val="dk1"/>
-              </a:buClr>
-              <a:buSzPct val="84615"/>
-              <a:buFont typeface="Arial"/>
-              <a:buNone/>
-            </a:pPr>
-            <a:r>
-              <a:rPr sz="1300" lang="en" i="1">
-                <a:solidFill>
-                  <a:schemeClr val="dk1"/>
-                </a:solidFill>
-                <a:latin typeface="Arial"/>
-                <a:ea typeface="Arial"/>
-                <a:cs typeface="Arial"/>
-                <a:sym typeface="Arial"/>
-              </a:rPr>
-              <a:t>High level goal:  Level Progression</a:t>
-            </a:r>
-          </a:p>
-          <a:p>
-            <a:pPr rtl="0" lvl="0">
-              <a:lnSpc>
-                <a:spcPct val="115000"/>
-              </a:lnSpc>
-              <a:spcBef>
-                <a:spcPts val="800"/>
-              </a:spcBef>
-              <a:buClr>
-                <a:schemeClr val="dk1"/>
-              </a:buClr>
-              <a:buSzPct val="84615"/>
-              <a:buFont typeface="Arial"/>
-              <a:buNone/>
-            </a:pPr>
-            <a:r>
-              <a:rPr sz="1300" lang="en">
-                <a:solidFill>
-                  <a:schemeClr val="dk1"/>
-                </a:solidFill>
-                <a:latin typeface="Arial"/>
-                <a:ea typeface="Arial"/>
-                <a:cs typeface="Arial"/>
-                <a:sym typeface="Arial"/>
-              </a:rPr>
-              <a:t>(3 SP) As a player, I need guidance on how to play so I can learn the controls.</a:t>
-            </a:r>
-          </a:p>
-          <a:p>
-            <a:pPr rtl="0" lvl="0">
-              <a:lnSpc>
-                <a:spcPct val="115000"/>
-              </a:lnSpc>
-              <a:spcBef>
-                <a:spcPts val="800"/>
-              </a:spcBef>
-              <a:buClr>
-                <a:schemeClr val="dk1"/>
-              </a:buClr>
-              <a:buSzPct val="84615"/>
-              <a:buFont typeface="Arial"/>
-              <a:buNone/>
-            </a:pPr>
-            <a:r>
-              <a:rPr sz="1300" lang="en" i="1">
-                <a:solidFill>
-                  <a:schemeClr val="dk1"/>
-                </a:solidFill>
-                <a:latin typeface="Arial"/>
-                <a:ea typeface="Arial"/>
-                <a:cs typeface="Arial"/>
-                <a:sym typeface="Arial"/>
-              </a:rPr>
-              <a:t>HLG:  Test driven code implementation (Game playtesting, concept and application) and get feedback</a:t>
-            </a:r>
-          </a:p>
-          <a:p>
-            <a:pPr rtl="0" lvl="0">
-              <a:lnSpc>
-                <a:spcPct val="115000"/>
-              </a:lnSpc>
-              <a:spcBef>
-                <a:spcPts val="800"/>
-              </a:spcBef>
-              <a:buClr>
-                <a:schemeClr val="dk1"/>
-              </a:buClr>
-              <a:buSzPct val="84615"/>
-              <a:buFont typeface="Arial"/>
-              <a:buNone/>
-            </a:pPr>
-            <a:r>
-              <a:rPr sz="1300" lang="en">
-                <a:solidFill>
-                  <a:schemeClr val="dk1"/>
-                </a:solidFill>
-                <a:latin typeface="Arial"/>
-                <a:ea typeface="Arial"/>
-                <a:cs typeface="Arial"/>
-                <a:sym typeface="Arial"/>
-              </a:rPr>
-              <a:t>(2 SP) User Story 1: As a product owner, I need to set up an integration system for the team so we can collaborate.</a:t>
-            </a:r>
-          </a:p>
-          <a:p>
-            <a:pPr rtl="0" lvl="0">
-              <a:lnSpc>
-                <a:spcPct val="115000"/>
-              </a:lnSpc>
-              <a:spcBef>
-                <a:spcPts val="800"/>
-              </a:spcBef>
-              <a:buClr>
-                <a:schemeClr val="dk1"/>
-              </a:buClr>
-              <a:buSzPct val="84615"/>
-              <a:buFont typeface="Arial"/>
-              <a:buNone/>
-            </a:pPr>
-            <a:r>
-              <a:rPr sz="1300" lang="en" i="1">
-                <a:solidFill>
-                  <a:schemeClr val="dk1"/>
-                </a:solidFill>
-                <a:latin typeface="Arial"/>
-                <a:ea typeface="Arial"/>
-                <a:cs typeface="Arial"/>
-                <a:sym typeface="Arial"/>
-              </a:rPr>
-              <a:t>HLG: Continuous integration using Git.</a:t>
-            </a:r>
-          </a:p>
-          <a:p>
-            <a:pPr rtl="0" lvl="0">
-              <a:lnSpc>
-                <a:spcPct val="115000"/>
-              </a:lnSpc>
-              <a:spcBef>
-                <a:spcPts val="800"/>
-              </a:spcBef>
-              <a:buClr>
-                <a:schemeClr val="dk1"/>
-              </a:buClr>
-              <a:buSzPct val="84615"/>
-              <a:buFont typeface="Arial"/>
-              <a:buNone/>
-            </a:pPr>
-            <a:r>
-              <a:rPr sz="1300" lang="en">
-                <a:solidFill>
-                  <a:schemeClr val="dk1"/>
-                </a:solidFill>
-                <a:latin typeface="Arial"/>
-                <a:ea typeface="Arial"/>
-                <a:cs typeface="Arial"/>
-                <a:sym typeface="Arial"/>
-              </a:rPr>
-              <a:t>(8 SP) User Story 2: As a product owner, I want to prototype the game and so I can learn about user interaction.</a:t>
-            </a:r>
-          </a:p>
-          <a:p>
-            <a:pPr rtl="0" lvl="0">
-              <a:lnSpc>
-                <a:spcPct val="115000"/>
-              </a:lnSpc>
-              <a:spcBef>
-                <a:spcPts val="800"/>
-              </a:spcBef>
-              <a:buClr>
-                <a:schemeClr val="dk1"/>
-              </a:buClr>
-              <a:buSzPct val="84615"/>
-              <a:buFont typeface="Arial"/>
-              <a:buNone/>
-            </a:pPr>
-            <a:r>
-              <a:rPr sz="1300" lang="en" i="1">
-                <a:solidFill>
-                  <a:schemeClr val="dk1"/>
-                </a:solidFill>
-                <a:latin typeface="Arial"/>
-                <a:ea typeface="Arial"/>
-                <a:cs typeface="Arial"/>
-                <a:sym typeface="Arial"/>
-              </a:rPr>
-              <a:t>HLG: Prototype testing</a:t>
-            </a:r>
-          </a:p>
-        </p:txBody>
-      </p:sp>
+          <p:cNvGraphicFramePr/>
+          <p:nvPr/>
+        </p:nvGraphicFramePr>
+        <p:xfrm>
+          <a:off y="1381075" x="979012"/>
+          <a:ext cy="3000000" cx="3000000"/>
+        </p:xfrm>
+        <a:graphic>
+          <a:graphicData uri="http://schemas.openxmlformats.org/drawingml/2006/table">
+            <a:tbl>
+              <a:tblPr>
+                <a:noFill/>
+                <a:tableStyleId>{043E5D9E-EA44-4E2F-9CEF-E8A2C63CC4CA}</a:tableStyleId>
+              </a:tblPr>
+              <a:tblGrid>
+                <a:gridCol w="2634275"/>
+                <a:gridCol w="2634275"/>
+                <a:gridCol w="1996550"/>
+              </a:tblGrid>
+              <a:tr h="690700">
+                <a:tc>
+                  <a:txBody>
+                    <a:bodyPr>
+                      <a:noAutofit/>
+                    </a:bodyPr>
+                    <a:lstStyle/>
+                    <a:p>
+                      <a:pPr rtl="0" lvl="0">
+                        <a:spcBef>
+                          <a:spcPts val="0"/>
+                        </a:spcBef>
+                        <a:buNone/>
+                      </a:pPr>
+                      <a:r>
+                        <a:rPr b="1" sz="1200" lang="en"/>
+                        <a:t>Sprint 1 (Alpha)</a:t>
+                      </a:r>
+                    </a:p>
+                  </a:txBody>
+                  <a:tcPr marR="63500" marB="63500" marT="63500" marL="63500"/>
+                </a:tc>
+                <a:tc>
+                  <a:txBody>
+                    <a:bodyPr>
+                      <a:noAutofit/>
+                    </a:bodyPr>
+                    <a:lstStyle/>
+                    <a:p>
+                      <a:pPr rtl="0">
+                        <a:spcBef>
+                          <a:spcPts val="0"/>
+                        </a:spcBef>
+                        <a:buNone/>
+                      </a:pPr>
+                      <a:r>
+                        <a:rPr b="1" sz="1200" lang="en"/>
+                        <a:t>High Level Goal</a:t>
+                      </a:r>
+                    </a:p>
+                    <a:p>
+                      <a:pPr rtl="0" lvl="0">
+                        <a:spcBef>
+                          <a:spcPts val="0"/>
+                        </a:spcBef>
+                        <a:buNone/>
+                      </a:pPr>
+                      <a:r>
+                        <a:rPr sz="1200" lang="en">
+                          <a:solidFill>
+                            <a:schemeClr val="dk1"/>
+                          </a:solidFill>
+                        </a:rPr>
+                        <a:t>Working prototype that can be used across the team for testing each part of the program.</a:t>
+                      </a:r>
+                    </a:p>
+                  </a:txBody>
+                  <a:tcPr marR="63500" marB="63500" marT="63500" marL="63500"/>
+                </a:tc>
+                <a:tc>
+                  <a:txBody>
+                    <a:bodyPr>
+                      <a:noAutofit/>
+                    </a:bodyPr>
+                    <a:lstStyle/>
+                    <a:p>
+                      <a:pPr rtl="0" lvl="0">
+                        <a:spcBef>
+                          <a:spcPts val="0"/>
+                        </a:spcBef>
+                        <a:buNone/>
+                      </a:pPr>
+                      <a:r>
+                        <a:rPr b="1" sz="1200" lang="en"/>
+                        <a:t>SP</a:t>
+                      </a:r>
+                    </a:p>
+                  </a:txBody>
+                  <a:tcPr marR="63500" marB="63500" marT="63500" marL="63500"/>
+                </a:tc>
+              </a:tr>
+              <a:tr h="690700">
+                <a:tc>
+                  <a:txBody>
+                    <a:bodyPr>
+                      <a:noAutofit/>
+                    </a:bodyPr>
+                    <a:lstStyle/>
+                    <a:p>
+                      <a:pPr rtl="0" lvl="0">
+                        <a:spcBef>
+                          <a:spcPts val="0"/>
+                        </a:spcBef>
+                        <a:buNone/>
+                      </a:pPr>
+                      <a:r>
+                        <a:rPr sz="1200" lang="en"/>
+                        <a:t>As a product owner, I want a prototype that can demonstrate the core features of the game, so I know it is heading in the right direction.</a:t>
+                      </a:r>
+                    </a:p>
+                  </a:txBody>
+                  <a:tcPr marR="63500" marB="63500" marT="63500" marL="63500"/>
+                </a:tc>
+                <a:tc>
+                  <a:txBody>
+                    <a:bodyPr>
+                      <a:noAutofit/>
+                    </a:bodyPr>
+                    <a:lstStyle/>
+                    <a:p>
+                      <a:pPr rtl="0" lvl="0">
+                        <a:spcBef>
+                          <a:spcPts val="0"/>
+                        </a:spcBef>
+                        <a:buNone/>
+                      </a:pPr>
+                      <a:r>
+                        <a:rPr sz="1200" lang="en">
+                          <a:solidFill>
+                            <a:schemeClr val="dk1"/>
+                          </a:solidFill>
+                        </a:rPr>
+                        <a:t>Sample level code</a:t>
+                      </a:r>
+                    </a:p>
+                  </a:txBody>
+                  <a:tcPr marR="63500" marB="63500" marT="63500" marL="63500"/>
+                </a:tc>
+                <a:tc>
+                  <a:txBody>
+                    <a:bodyPr>
+                      <a:noAutofit/>
+                    </a:bodyPr>
+                    <a:lstStyle/>
+                    <a:p>
+                      <a:pPr rtl="0" lvl="0">
+                        <a:spcBef>
+                          <a:spcPts val="0"/>
+                        </a:spcBef>
+                        <a:buNone/>
+                      </a:pPr>
+                      <a:r>
+                        <a:rPr sz="1200" lang="en"/>
+                        <a:t>13</a:t>
+                      </a:r>
+                    </a:p>
+                  </a:txBody>
+                  <a:tcPr marR="63500" marB="63500" marT="63500" marL="63500"/>
+                </a:tc>
+              </a:tr>
+              <a:tr h="690700">
+                <a:tc>
+                  <a:txBody>
+                    <a:bodyPr>
+                      <a:noAutofit/>
+                    </a:bodyPr>
+                    <a:lstStyle/>
+                    <a:p>
+                      <a:pPr rtl="0" lvl="0">
+                        <a:spcBef>
+                          <a:spcPts val="0"/>
+                        </a:spcBef>
+                        <a:buNone/>
+                      </a:pPr>
+                      <a:r>
+                        <a:rPr sz="1200" lang="en"/>
+                        <a:t>As a product owner, I need an integration system, so the team can collaborate.</a:t>
+                      </a:r>
+                    </a:p>
+                  </a:txBody>
+                  <a:tcPr marR="63500" marB="63500" marT="63500" marL="63500"/>
+                </a:tc>
+                <a:tc>
+                  <a:txBody>
+                    <a:bodyPr>
+                      <a:noAutofit/>
+                    </a:bodyPr>
+                    <a:lstStyle/>
+                    <a:p>
+                      <a:pPr rtl="0" lvl="0">
+                        <a:spcBef>
+                          <a:spcPts val="0"/>
+                        </a:spcBef>
+                        <a:buNone/>
+                      </a:pPr>
+                      <a:r>
+                        <a:rPr sz="1200" lang="en">
+                          <a:solidFill>
+                            <a:schemeClr val="dk1"/>
+                          </a:solidFill>
+                        </a:rPr>
+                        <a:t>Continuous integration using Git</a:t>
+                      </a:r>
+                    </a:p>
+                  </a:txBody>
+                  <a:tcPr marR="63500" marB="63500" marT="63500" marL="63500"/>
+                </a:tc>
+                <a:tc>
+                  <a:txBody>
+                    <a:bodyPr>
+                      <a:noAutofit/>
+                    </a:bodyPr>
+                    <a:lstStyle/>
+                    <a:p>
+                      <a:pPr rtl="0" lvl="0">
+                        <a:spcBef>
+                          <a:spcPts val="0"/>
+                        </a:spcBef>
+                        <a:buNone/>
+                      </a:pPr>
+                      <a:r>
+                        <a:rPr sz="1200" lang="en"/>
+                        <a:t>2</a:t>
+                      </a:r>
+                    </a:p>
+                  </a:txBody>
+                  <a:tcPr marR="63500" marB="63500" marT="63500" marL="63500"/>
+                </a:tc>
+              </a:tr>
+              <a:tr h="690700">
+                <a:tc>
+                  <a:txBody>
+                    <a:bodyPr>
+                      <a:noAutofit/>
+                    </a:bodyPr>
+                    <a:lstStyle/>
+                    <a:p>
+                      <a:pPr rtl="0" lvl="0">
+                        <a:spcBef>
+                          <a:spcPts val="0"/>
+                        </a:spcBef>
+                        <a:buNone/>
+                      </a:pPr>
+                      <a:r>
+                        <a:rPr sz="1200" lang="en"/>
+                        <a:t>As a product owner, I want potential features demonstrated, so I can decide how to prioritize development. </a:t>
+                      </a:r>
+                    </a:p>
+                  </a:txBody>
+                  <a:tcPr marR="63500" marB="63500" marT="63500" marL="63500"/>
+                </a:tc>
+                <a:tc>
+                  <a:txBody>
+                    <a:bodyPr>
+                      <a:noAutofit/>
+                    </a:bodyPr>
+                    <a:lstStyle/>
+                    <a:p>
+                      <a:pPr rtl="0" lvl="0" marR="165100" indent="0" marL="0">
+                        <a:lnSpc>
+                          <a:spcPct val="115000"/>
+                        </a:lnSpc>
+                        <a:spcBef>
+                          <a:spcPts val="0"/>
+                        </a:spcBef>
+                        <a:buNone/>
+                      </a:pPr>
+                      <a:r>
+                        <a:rPr sz="1200" lang="en">
+                          <a:solidFill>
+                            <a:schemeClr val="dk1"/>
+                          </a:solidFill>
+                        </a:rPr>
+                        <a:t>Feature prototyping</a:t>
+                      </a:r>
+                    </a:p>
+                    <a:p>
+                      <a:pPr rtl="0" lvl="0">
+                        <a:spcBef>
+                          <a:spcPts val="0"/>
+                        </a:spcBef>
+                        <a:buNone/>
+                      </a:pPr>
+                      <a:r>
+                        <a:t/>
+                      </a:r>
+                      <a:endParaRPr sz="1200"/>
+                    </a:p>
+                  </a:txBody>
+                  <a:tcPr marR="63500" marB="63500" marT="63500" marL="63500"/>
+                </a:tc>
+                <a:tc>
+                  <a:txBody>
+                    <a:bodyPr>
+                      <a:noAutofit/>
+                    </a:bodyPr>
+                    <a:lstStyle/>
+                    <a:p>
+                      <a:pPr rtl="0" lvl="0">
+                        <a:spcBef>
+                          <a:spcPts val="0"/>
+                        </a:spcBef>
+                        <a:buNone/>
+                      </a:pPr>
+                      <a:r>
+                        <a:rPr sz="1200" lang="en"/>
+                        <a:t>5</a:t>
+                      </a:r>
+                    </a:p>
+                  </a:txBody>
+                  <a:tcPr marR="63500" marB="63500" marT="63500" marL="63500"/>
+                </a:tc>
+              </a:tr>
+            </a:tbl>
+          </a:graphicData>
+        </a:graphic>
+      </p:graphicFrame>
     </p:spTree>
   </p:cSld>
   <p:clrMapOvr>
@@ -5948,390 +6526,1994 @@
           </a:p>
         </p:txBody>
       </p:sp>
+      <p:graphicFrame>
+        <p:nvGraphicFramePr>
+          <p:cNvPr id="98" name="Shape 98"/>
+          <p:cNvGraphicFramePr/>
+          <p:nvPr/>
+        </p:nvGraphicFramePr>
+        <p:xfrm>
+          <a:off y="1271087" x="638900"/>
+          <a:ext cy="3000000" cx="3000000"/>
+        </p:xfrm>
+        <a:graphic>
+          <a:graphicData uri="http://schemas.openxmlformats.org/drawingml/2006/table">
+            <a:tbl>
+              <a:tblPr>
+                <a:noFill/>
+                <a:tableStyleId>{8C22D7EA-2A43-4DF2-A6F2-71A7EA68EA27}</a:tableStyleId>
+              </a:tblPr>
+              <a:tblGrid>
+                <a:gridCol w="3520975"/>
+                <a:gridCol w="2833700"/>
+                <a:gridCol w="1490625"/>
+              </a:tblGrid>
+              <a:tr h="683650">
+                <a:tc>
+                  <a:txBody>
+                    <a:bodyPr>
+                      <a:noAutofit/>
+                    </a:bodyPr>
+                    <a:lstStyle/>
+                    <a:p>
+                      <a:pPr rtl="0" lvl="0">
+                        <a:spcBef>
+                          <a:spcPts val="0"/>
+                        </a:spcBef>
+                        <a:buNone/>
+                      </a:pPr>
+                      <a:r>
+                        <a:rPr b="1" sz="1200" lang="en"/>
+                        <a:t>Sprint 2 (Beta)</a:t>
+                      </a:r>
+                    </a:p>
+                  </a:txBody>
+                  <a:tcPr marR="63500" marB="63500" marT="63500" marL="63500"/>
+                </a:tc>
+                <a:tc>
+                  <a:txBody>
+                    <a:bodyPr>
+                      <a:noAutofit/>
+                    </a:bodyPr>
+                    <a:lstStyle/>
+                    <a:p>
+                      <a:pPr rtl="0">
+                        <a:spcBef>
+                          <a:spcPts val="0"/>
+                        </a:spcBef>
+                        <a:buNone/>
+                      </a:pPr>
+                      <a:r>
+                        <a:rPr b="1" sz="1200" lang="en"/>
+                        <a:t>High Level Goal</a:t>
+                      </a:r>
+                    </a:p>
+                    <a:p>
+                      <a:pPr rtl="0" lvl="0">
+                        <a:spcBef>
+                          <a:spcPts val="0"/>
+                        </a:spcBef>
+                        <a:buNone/>
+                      </a:pPr>
+                      <a:r>
+                        <a:rPr sz="1200" lang="en">
+                          <a:solidFill>
+                            <a:schemeClr val="dk1"/>
+                          </a:solidFill>
+                        </a:rPr>
+                        <a:t>All critical functionality implemented for having a playable game</a:t>
+                      </a:r>
+                    </a:p>
+                  </a:txBody>
+                  <a:tcPr marR="63500" marB="63500" marT="63500" marL="63500"/>
+                </a:tc>
+                <a:tc>
+                  <a:txBody>
+                    <a:bodyPr>
+                      <a:noAutofit/>
+                    </a:bodyPr>
+                    <a:lstStyle/>
+                    <a:p>
+                      <a:pPr rtl="0" lvl="0">
+                        <a:spcBef>
+                          <a:spcPts val="0"/>
+                        </a:spcBef>
+                        <a:buNone/>
+                      </a:pPr>
+                      <a:r>
+                        <a:rPr b="1" sz="1200" lang="en"/>
+                        <a:t>SP</a:t>
+                      </a:r>
+                    </a:p>
+                  </a:txBody>
+                  <a:tcPr marR="63500" marB="63500" marT="63500" marL="63500"/>
+                </a:tc>
+              </a:tr>
+              <a:tr h="567475">
+                <a:tc>
+                  <a:txBody>
+                    <a:bodyPr>
+                      <a:noAutofit/>
+                    </a:bodyPr>
+                    <a:lstStyle/>
+                    <a:p>
+                      <a:pPr rtl="0" lvl="0">
+                        <a:spcBef>
+                          <a:spcPts val="0"/>
+                        </a:spcBef>
+                        <a:buNone/>
+                      </a:pPr>
+                      <a:r>
+                        <a:rPr sz="1200" lang="en"/>
+                        <a:t>As a player I want the game to recognize I am a winner so I can feel accomplished.</a:t>
+                      </a:r>
+                    </a:p>
+                  </a:txBody>
+                  <a:tcPr marR="63500" marB="63500" marT="63500" marL="63500"/>
+                </a:tc>
+                <a:tc>
+                  <a:txBody>
+                    <a:bodyPr>
+                      <a:noAutofit/>
+                    </a:bodyPr>
+                    <a:lstStyle/>
+                    <a:p>
+                      <a:pPr rtl="0">
+                        <a:spcBef>
+                          <a:spcPts val="0"/>
+                        </a:spcBef>
+                        <a:buNone/>
+                      </a:pPr>
+                      <a:r>
+                        <a:t/>
+                      </a:r>
+                      <a:endParaRPr sz="1200"/>
+                    </a:p>
+                    <a:p>
+                      <a:pPr rtl="0">
+                        <a:spcBef>
+                          <a:spcPts val="0"/>
+                        </a:spcBef>
+                        <a:buNone/>
+                      </a:pPr>
+                      <a:r>
+                        <a:rPr sz="1200" lang="en">
+                          <a:solidFill>
+                            <a:schemeClr val="dk1"/>
+                          </a:solidFill>
+                        </a:rPr>
+                        <a:t>Fully functional GUI</a:t>
+                      </a:r>
+                    </a:p>
+                    <a:p>
+                      <a:pPr rtl="0" lvl="0">
+                        <a:spcBef>
+                          <a:spcPts val="0"/>
+                        </a:spcBef>
+                        <a:buNone/>
+                      </a:pPr>
+                      <a:r>
+                        <a:t/>
+                      </a:r>
+                      <a:endParaRPr sz="1200"/>
+                    </a:p>
+                  </a:txBody>
+                  <a:tcPr marR="63500" marB="63500" marT="63500" marL="63500"/>
+                </a:tc>
+                <a:tc>
+                  <a:txBody>
+                    <a:bodyPr>
+                      <a:noAutofit/>
+                    </a:bodyPr>
+                    <a:lstStyle/>
+                    <a:p>
+                      <a:pPr rtl="0" lvl="0">
+                        <a:spcBef>
+                          <a:spcPts val="0"/>
+                        </a:spcBef>
+                        <a:buNone/>
+                      </a:pPr>
+                      <a:r>
+                        <a:rPr sz="1200" lang="en"/>
+                        <a:t>2</a:t>
+                      </a:r>
+                    </a:p>
+                  </a:txBody>
+                  <a:tcPr marR="63500" marB="63500" marT="63500" marL="63500"/>
+                </a:tc>
+              </a:tr>
+              <a:tr h="581175">
+                <a:tc>
+                  <a:txBody>
+                    <a:bodyPr>
+                      <a:noAutofit/>
+                    </a:bodyPr>
+                    <a:lstStyle/>
+                    <a:p>
+                      <a:pPr rtl="0" lvl="0">
+                        <a:spcBef>
+                          <a:spcPts val="0"/>
+                        </a:spcBef>
+                        <a:buNone/>
+                      </a:pPr>
+                      <a:r>
+                        <a:rPr sz="1200" lang="en"/>
+                        <a:t>As a product owner, I want a fully functional level, so I can begin testing the game on potential players. </a:t>
+                      </a:r>
+                    </a:p>
+                  </a:txBody>
+                  <a:tcPr marR="63500" marB="63500" marT="63500" marL="63500"/>
+                </a:tc>
+                <a:tc>
+                  <a:txBody>
+                    <a:bodyPr>
+                      <a:noAutofit/>
+                    </a:bodyPr>
+                    <a:lstStyle/>
+                    <a:p>
+                      <a:pPr rtl="0" lvl="0" marR="165100" indent="0" marL="0">
+                        <a:lnSpc>
+                          <a:spcPct val="115000"/>
+                        </a:lnSpc>
+                        <a:spcBef>
+                          <a:spcPts val="0"/>
+                        </a:spcBef>
+                        <a:buNone/>
+                      </a:pPr>
+                      <a:r>
+                        <a:rPr sz="1200" lang="en">
+                          <a:solidFill>
+                            <a:schemeClr val="dk1"/>
+                          </a:solidFill>
+                        </a:rPr>
+                        <a:t>Fully functional gameplay</a:t>
+                      </a:r>
+                    </a:p>
+                    <a:p>
+                      <a:pPr rtl="0" marR="165100" indent="0" marL="0">
+                        <a:lnSpc>
+                          <a:spcPct val="115000"/>
+                        </a:lnSpc>
+                        <a:spcBef>
+                          <a:spcPts val="0"/>
+                        </a:spcBef>
+                        <a:buNone/>
+                      </a:pPr>
+                      <a:r>
+                        <a:rPr sz="1200" lang="en">
+                          <a:solidFill>
+                            <a:schemeClr val="dk1"/>
+                          </a:solidFill>
+                        </a:rPr>
+                        <a:t>Fully functional GUI</a:t>
+                      </a:r>
+                    </a:p>
+                    <a:p>
+                      <a:pPr rtl="0" lvl="0" marR="165100" indent="0" marL="0">
+                        <a:lnSpc>
+                          <a:spcPct val="115000"/>
+                        </a:lnSpc>
+                        <a:spcBef>
+                          <a:spcPts val="0"/>
+                        </a:spcBef>
+                        <a:buNone/>
+                      </a:pPr>
+                      <a:r>
+                        <a:rPr sz="1200" lang="en">
+                          <a:solidFill>
+                            <a:schemeClr val="dk1"/>
+                          </a:solidFill>
+                        </a:rPr>
+                        <a:t>Product testing</a:t>
+                      </a:r>
+                    </a:p>
+                  </a:txBody>
+                  <a:tcPr marR="63500" marB="63500" marT="63500" marL="63500"/>
+                </a:tc>
+                <a:tc>
+                  <a:txBody>
+                    <a:bodyPr>
+                      <a:noAutofit/>
+                    </a:bodyPr>
+                    <a:lstStyle/>
+                    <a:p>
+                      <a:pPr rtl="0" lvl="0">
+                        <a:spcBef>
+                          <a:spcPts val="0"/>
+                        </a:spcBef>
+                        <a:buNone/>
+                      </a:pPr>
+                      <a:r>
+                        <a:rPr sz="1200" lang="en"/>
+                        <a:t>8</a:t>
+                      </a:r>
+                    </a:p>
+                  </a:txBody>
+                  <a:tcPr marR="63500" marB="63500" marT="63500" marL="63500"/>
+                </a:tc>
+              </a:tr>
+              <a:tr h="709850">
+                <a:tc>
+                  <a:txBody>
+                    <a:bodyPr>
+                      <a:noAutofit/>
+                    </a:bodyPr>
+                    <a:lstStyle/>
+                    <a:p>
+                      <a:pPr rtl="0" lvl="0">
+                        <a:spcBef>
+                          <a:spcPts val="0"/>
+                        </a:spcBef>
+                        <a:buNone/>
+                      </a:pPr>
+                      <a:r>
+                        <a:rPr sz="1200" lang="en"/>
+                        <a:t>As a product owner, I want a solid idea of what can be included in the final release, so that I can begin pitching the game. </a:t>
+                      </a:r>
+                    </a:p>
+                  </a:txBody>
+                  <a:tcPr marR="63500" marB="63500" marT="63500" marL="63500"/>
+                </a:tc>
+                <a:tc>
+                  <a:txBody>
+                    <a:bodyPr>
+                      <a:noAutofit/>
+                    </a:bodyPr>
+                    <a:lstStyle/>
+                    <a:p>
+                      <a:pPr rtl="0" lvl="0">
+                        <a:spcBef>
+                          <a:spcPts val="0"/>
+                        </a:spcBef>
+                        <a:buNone/>
+                      </a:pPr>
+                      <a:r>
+                        <a:rPr sz="1200" lang="en">
+                          <a:solidFill>
+                            <a:schemeClr val="dk1"/>
+                          </a:solidFill>
+                        </a:rPr>
+                        <a:t>Finalized features for release</a:t>
+                      </a:r>
+                    </a:p>
+                  </a:txBody>
+                  <a:tcPr marR="63500" marB="63500" marT="63500" marL="63500"/>
+                </a:tc>
+                <a:tc>
+                  <a:txBody>
+                    <a:bodyPr>
+                      <a:noAutofit/>
+                    </a:bodyPr>
+                    <a:lstStyle/>
+                    <a:p>
+                      <a:pPr rtl="0" lvl="0">
+                        <a:spcBef>
+                          <a:spcPts val="0"/>
+                        </a:spcBef>
+                        <a:buNone/>
+                      </a:pPr>
+                      <a:r>
+                        <a:rPr sz="1200" lang="en"/>
+                        <a:t>3</a:t>
+                      </a:r>
+                    </a:p>
+                  </a:txBody>
+                  <a:tcPr marR="63500" marB="63500" marT="63500" marL="63500"/>
+                </a:tc>
+              </a:tr>
+              <a:tr h="537950">
+                <a:tc>
+                  <a:txBody>
+                    <a:bodyPr>
+                      <a:noAutofit/>
+                    </a:bodyPr>
+                    <a:lstStyle/>
+                    <a:p>
+                      <a:pPr rtl="0" lvl="0">
+                        <a:spcBef>
+                          <a:spcPts val="0"/>
+                        </a:spcBef>
+                        <a:buNone/>
+                      </a:pPr>
+                      <a:r>
+                        <a:rPr sz="1200" lang="en"/>
+                        <a:t>As a player, I want a menu screen so I can choose which level I want to play.</a:t>
+                      </a:r>
+                    </a:p>
+                  </a:txBody>
+                  <a:tcPr marR="63500" marB="63500" marT="63500" marL="63500"/>
+                </a:tc>
+                <a:tc>
+                  <a:txBody>
+                    <a:bodyPr>
+                      <a:noAutofit/>
+                    </a:bodyPr>
+                    <a:lstStyle/>
+                    <a:p>
+                      <a:pPr rtl="0" lvl="0">
+                        <a:spcBef>
+                          <a:spcPts val="0"/>
+                        </a:spcBef>
+                        <a:buNone/>
+                      </a:pPr>
+                      <a:r>
+                        <a:rPr sz="1200" lang="en">
+                          <a:solidFill>
+                            <a:schemeClr val="dk1"/>
+                          </a:solidFill>
+                        </a:rPr>
+                        <a:t>Fully functional GUI</a:t>
+                      </a:r>
+                    </a:p>
+                  </a:txBody>
+                  <a:tcPr marR="63500" marB="63500" marT="63500" marL="63500"/>
+                </a:tc>
+                <a:tc>
+                  <a:txBody>
+                    <a:bodyPr>
+                      <a:noAutofit/>
+                    </a:bodyPr>
+                    <a:lstStyle/>
+                    <a:p>
+                      <a:pPr rtl="0" lvl="0">
+                        <a:spcBef>
+                          <a:spcPts val="0"/>
+                        </a:spcBef>
+                        <a:buNone/>
+                      </a:pPr>
+                      <a:r>
+                        <a:rPr sz="1200" lang="en"/>
+                        <a:t>5</a:t>
+                      </a:r>
+                    </a:p>
+                  </a:txBody>
+                  <a:tcPr marR="63500" marB="63500" marT="63500" marL="63500"/>
+                </a:tc>
+              </a:tr>
+            </a:tbl>
+          </a:graphicData>
+        </a:graphic>
+      </p:graphicFrame>
+    </p:spTree>
+  </p:cSld>
+  <p:clrMapOvr>
+    <a:masterClrMapping/>
+  </p:clrMapOvr>
+  <p:transition spd="slow">
+    <p:cut/>
+  </p:transition>
+</p:sld>
+</file>
+
+<file path=ppt/slides/slide6.xml><?xml version="1.0" encoding="utf-8"?>
+<p:sld xmlns:a="http://schemas.openxmlformats.org/drawingml/2006/main" xmlns:r="http://schemas.openxmlformats.org/officeDocument/2006/relationships" xmlns:mc="http://schemas.openxmlformats.org/markup-compatibility/2006" xmlns:mv="urn:schemas-microsoft-com:mac:vml" xmlns:p="http://schemas.openxmlformats.org/presentationml/2006/main" xmlns:c="http://schemas.openxmlformats.org/drawingml/2006/chart" xmlns:dgm="http://schemas.openxmlformats.org/drawingml/2006/diagram" xmlns:o="urn:schemas-microsoft-com:office:office" xmlns:v="urn:schemas-microsoft-com:vml" xmlns:pvml="urn:schemas-microsoft-com:office:powerpoint" xmlns:com="http://schemas.openxmlformats.org/drawingml/2006/compatibility" xmlns:p14="http://schemas.microsoft.com/office/powerpoint/2010/main">
+  <p:cSld>
+    <p:spTree>
+      <p:nvGrpSpPr>
+        <p:cNvPr id="102" name="Shape 102"/>
+        <p:cNvGrpSpPr/>
+        <p:nvPr/>
+      </p:nvGrpSpPr>
+      <p:grpSpPr>
+        <a:xfrm>
+          <a:off y="0" x="0"/>
+          <a:ext cy="0" cx="0"/>
+          <a:chOff y="0" x="0"/>
+          <a:chExt cy="0" cx="0"/>
+        </a:xfrm>
+      </p:grpSpPr>
       <p:sp>
         <p:nvSpPr>
-          <p:cNvPr id="98" name="Shape 98"/>
+          <p:cNvPr id="103" name="Shape 103"/>
           <p:cNvSpPr txBox="1"/>
           <p:nvPr>
-            <p:ph idx="1" type="body"/>
+            <p:ph type="title"/>
           </p:nvPr>
         </p:nvSpPr>
         <p:spPr>
           <a:xfrm>
-            <a:off y="1200150" x="457200"/>
-            <a:ext cy="3531899" cx="8229600"/>
+            <a:off y="205978" x="457200"/>
+            <a:ext cy="857400" cx="8229600"/>
           </a:xfrm>
           <a:prstGeom prst="rect">
             <a:avLst/>
           </a:prstGeom>
         </p:spPr>
         <p:txBody>
-          <a:bodyPr bIns="91425" rIns="91425" lIns="91425" tIns="91425" anchor="t" anchorCtr="0">
+          <a:bodyPr bIns="91425" rIns="91425" lIns="91425" tIns="91425" anchor="b" anchorCtr="0">
             <a:noAutofit/>
           </a:bodyPr>
           <a:lstStyle/>
           <a:p>
-            <a:pPr rtl="0" lvl="0">
-              <a:lnSpc>
-                <a:spcPct val="115000"/>
-              </a:lnSpc>
-              <a:spcBef>
-                <a:spcPts val="800"/>
-              </a:spcBef>
-              <a:buNone/>
-            </a:pPr>
-            <a:r>
-              <a:rPr b="1" sz="1200" lang="en">
-                <a:solidFill>
-                  <a:schemeClr val="dk1"/>
-                </a:solidFill>
-                <a:latin typeface="Arial"/>
-                <a:ea typeface="Arial"/>
-                <a:cs typeface="Arial"/>
-                <a:sym typeface="Arial"/>
-              </a:rPr>
-              <a:t>Sprint 2</a:t>
-            </a:r>
-          </a:p>
-          <a:p>
-            <a:pPr rtl="0" lvl="0">
-              <a:lnSpc>
-                <a:spcPct val="115000"/>
-              </a:lnSpc>
-              <a:spcBef>
-                <a:spcPts val="800"/>
-              </a:spcBef>
-              <a:buNone/>
-            </a:pPr>
-            <a:r>
-              <a:rPr sz="1100" lang="en">
-                <a:solidFill>
-                  <a:schemeClr val="dk1"/>
-                </a:solidFill>
-                <a:latin typeface="Arial"/>
-                <a:ea typeface="Arial"/>
-                <a:cs typeface="Arial"/>
-                <a:sym typeface="Arial"/>
-              </a:rPr>
-              <a:t>(1 SP) As a player I want to see how many moves it took to complete a level so I can compare my score with other players.  </a:t>
-            </a:r>
-          </a:p>
-          <a:p>
-            <a:pPr rtl="0" lvl="0">
-              <a:lnSpc>
-                <a:spcPct val="115000"/>
-              </a:lnSpc>
-              <a:spcBef>
-                <a:spcPts val="800"/>
+            <a:pPr algn="ctr" rtl="0" lvl="0">
+              <a:spcBef>
+                <a:spcPts val="0"/>
               </a:spcBef>
               <a:buClr>
                 <a:schemeClr val="dk1"/>
               </a:buClr>
-              <a:buSzPct val="100000"/>
+              <a:buSzPct val="36666"/>
               <a:buFont typeface="Arial"/>
               <a:buNone/>
             </a:pPr>
             <a:r>
-              <a:rPr sz="1100" lang="en" i="1">
+              <a:rPr sz="3000" lang="en">
                 <a:solidFill>
                   <a:schemeClr val="dk1"/>
                 </a:solidFill>
-                <a:latin typeface="Arial"/>
-                <a:ea typeface="Arial"/>
-                <a:cs typeface="Arial"/>
-                <a:sym typeface="Arial"/>
               </a:rPr>
-              <a:t> HLG: Test driven code implementation (Game playtesting, concept and application)</a:t>
+              <a:t>Project Release Plan - User Stories</a:t>
             </a:r>
           </a:p>
           <a:p>
-            <a:pPr rtl="0" lvl="0">
-              <a:lnSpc>
-                <a:spcPct val="125454"/>
-              </a:lnSpc>
-              <a:spcBef>
-                <a:spcPts val="0"/>
-              </a:spcBef>
-              <a:buNone/>
-            </a:pPr>
-            <a:r>
-              <a:rPr sz="1100" lang="en">
-                <a:solidFill>
-                  <a:schemeClr val="dk1"/>
-                </a:solidFill>
-                <a:latin typeface="Arial"/>
-                <a:ea typeface="Arial"/>
-                <a:cs typeface="Arial"/>
-                <a:sym typeface="Arial"/>
-              </a:rPr>
-              <a:t>(8 SP) As a player I want a progression of levels that teach me how to play the game and become more challenging as I progress.   </a:t>
-            </a:r>
-          </a:p>
-          <a:p>
-            <a:pPr rtl="0" lvl="0">
-              <a:lnSpc>
-                <a:spcPct val="125454"/>
-              </a:lnSpc>
+            <a:pPr algn="ctr" lvl="0">
               <a:spcBef>
                 <a:spcPts val="0"/>
               </a:spcBef>
               <a:buClr>
                 <a:schemeClr val="dk1"/>
               </a:buClr>
-              <a:buSzPct val="100000"/>
+              <a:buSzPct val="36666"/>
               <a:buFont typeface="Arial"/>
               <a:buNone/>
             </a:pPr>
             <a:r>
-              <a:rPr sz="1100" lang="en" i="1">
+              <a:rPr sz="3000" lang="en">
                 <a:solidFill>
                   <a:schemeClr val="dk1"/>
                 </a:solidFill>
-                <a:latin typeface="Arial"/>
-                <a:ea typeface="Arial"/>
-                <a:cs typeface="Arial"/>
-                <a:sym typeface="Arial"/>
               </a:rPr>
-              <a:t>HLG:  Level progression										</a:t>
+              <a:t> Puzzle Dots</a:t>
             </a:r>
-            <a:r>
-              <a:rPr sz="1100" lang="en" i="1">
-                <a:solidFill>
-                  <a:schemeClr val="dk1"/>
-                </a:solidFill>
-                <a:latin typeface="Syncopate"/>
-                <a:ea typeface="Syncopate"/>
-                <a:cs typeface="Syncopate"/>
-                <a:sym typeface="Syncopate"/>
-              </a:rPr>
-              <a:t>	</a:t>
-            </a:r>
-            <a:r>
-              <a:rPr b="1" sz="1200" lang="en">
-                <a:solidFill>
-                  <a:schemeClr val="dk1"/>
-                </a:solidFill>
-                <a:latin typeface="Arial"/>
-                <a:ea typeface="Arial"/>
-                <a:cs typeface="Arial"/>
-                <a:sym typeface="Arial"/>
-              </a:rPr>
-              <a:t>Sprint 3</a:t>
-            </a:r>
-            <a:r>
-              <a:rPr sz="1200" lang="en">
-                <a:solidFill>
-                  <a:schemeClr val="dk1"/>
-                </a:solidFill>
-                <a:latin typeface="Arial"/>
-                <a:ea typeface="Arial"/>
-                <a:cs typeface="Arial"/>
-                <a:sym typeface="Arial"/>
-              </a:rPr>
-              <a:t> </a:t>
-            </a:r>
-          </a:p>
-          <a:p>
-            <a:pPr algn="r" rtl="0" lvl="0">
-              <a:lnSpc>
-                <a:spcPct val="115000"/>
-              </a:lnSpc>
-              <a:spcBef>
-                <a:spcPts val="800"/>
-              </a:spcBef>
-              <a:buNone/>
-            </a:pPr>
-            <a:r>
-              <a:rPr sz="1100" lang="en">
-                <a:solidFill>
-                  <a:schemeClr val="dk1"/>
-                </a:solidFill>
-                <a:latin typeface="Arial"/>
-                <a:ea typeface="Arial"/>
-                <a:cs typeface="Arial"/>
-                <a:sym typeface="Arial"/>
-              </a:rPr>
-              <a:t>(5 SP) As a player, I want an addicting game that saves my play state so I can return to it later.</a:t>
-            </a:r>
-          </a:p>
-          <a:p>
-            <a:pPr algn="r" rtl="0" lvl="0">
-              <a:lnSpc>
-                <a:spcPct val="115000"/>
-              </a:lnSpc>
-              <a:spcBef>
-                <a:spcPts val="800"/>
-              </a:spcBef>
-              <a:buNone/>
-            </a:pPr>
-            <a:r>
-              <a:rPr sz="1100" lang="en" i="1">
-                <a:solidFill>
-                  <a:schemeClr val="dk1"/>
-                </a:solidFill>
-                <a:latin typeface="Arial"/>
-                <a:ea typeface="Arial"/>
-                <a:cs typeface="Arial"/>
-                <a:sym typeface="Arial"/>
-              </a:rPr>
-              <a:t>HLG:  Test driven code implementation (Game playtesting, concept and application) </a:t>
-            </a:r>
-          </a:p>
-          <a:p>
-            <a:pPr algn="r" rtl="0" lvl="0">
-              <a:lnSpc>
-                <a:spcPct val="115000"/>
-              </a:lnSpc>
-              <a:spcBef>
-                <a:spcPts val="800"/>
-              </a:spcBef>
-              <a:buNone/>
-            </a:pPr>
-            <a:r>
-              <a:rPr sz="1100" lang="en">
-                <a:solidFill>
-                  <a:schemeClr val="dk1"/>
-                </a:solidFill>
-                <a:latin typeface="Arial"/>
-                <a:ea typeface="Arial"/>
-                <a:cs typeface="Arial"/>
-                <a:sym typeface="Arial"/>
-              </a:rPr>
-              <a:t>(8 SP) As a player, I want to be able to play this game on my phone or tablet so I can play on the go.</a:t>
-            </a:r>
-          </a:p>
-          <a:p>
-            <a:pPr algn="r" rtl="0" lvl="0">
-              <a:lnSpc>
-                <a:spcPct val="115000"/>
-              </a:lnSpc>
-              <a:spcBef>
-                <a:spcPts val="800"/>
-              </a:spcBef>
-              <a:buNone/>
-            </a:pPr>
-            <a:r>
-              <a:rPr sz="1100" lang="en" i="1">
-                <a:solidFill>
-                  <a:schemeClr val="dk1"/>
-                </a:solidFill>
-                <a:latin typeface="Arial"/>
-                <a:ea typeface="Arial"/>
-                <a:cs typeface="Arial"/>
-                <a:sym typeface="Arial"/>
-              </a:rPr>
-              <a:t>HLG: Available to play games on different platforms</a:t>
-            </a:r>
-          </a:p>
-          <a:p>
-            <a:pPr algn="r" rtl="0" lvl="0">
-              <a:lnSpc>
-                <a:spcPct val="115000"/>
-              </a:lnSpc>
-              <a:spcBef>
-                <a:spcPts val="800"/>
-              </a:spcBef>
-              <a:buNone/>
-            </a:pPr>
-            <a:r>
-              <a:rPr sz="1200" lang="en">
-                <a:solidFill>
-                  <a:schemeClr val="dk1"/>
-                </a:solidFill>
-                <a:latin typeface="Arial"/>
-                <a:ea typeface="Arial"/>
-                <a:cs typeface="Arial"/>
-                <a:sym typeface="Arial"/>
-              </a:rPr>
-              <a:t>(</a:t>
-            </a:r>
-            <a:r>
-              <a:rPr sz="1100" lang="en">
-                <a:solidFill>
-                  <a:schemeClr val="dk1"/>
-                </a:solidFill>
-                <a:latin typeface="Arial"/>
-                <a:ea typeface="Arial"/>
-                <a:cs typeface="Arial"/>
-                <a:sym typeface="Arial"/>
-              </a:rPr>
-              <a:t>3 SP) As a player, I want the puzzles to show solutions so that when I am stumped I can continue to the next level.</a:t>
-            </a:r>
-          </a:p>
-          <a:p>
-            <a:pPr algn="r" rtl="0" lvl="0">
-              <a:lnSpc>
-                <a:spcPct val="115000"/>
-              </a:lnSpc>
-              <a:spcBef>
-                <a:spcPts val="800"/>
-              </a:spcBef>
-              <a:buClr>
-                <a:schemeClr val="dk1"/>
-              </a:buClr>
-              <a:buSzPct val="100000"/>
-              <a:buFont typeface="Arial"/>
-              <a:buNone/>
-            </a:pPr>
-            <a:r>
-              <a:rPr sz="1100" lang="en" i="1">
-                <a:solidFill>
-                  <a:schemeClr val="dk1"/>
-                </a:solidFill>
-                <a:latin typeface="Arial"/>
-                <a:ea typeface="Arial"/>
-                <a:cs typeface="Arial"/>
-                <a:sym typeface="Arial"/>
-              </a:rPr>
-              <a:t>HLG:  </a:t>
-            </a:r>
-            <a:r>
-              <a:rPr sz="1200" lang="en" i="1">
-                <a:solidFill>
-                  <a:schemeClr val="dk1"/>
-                </a:solidFill>
-                <a:latin typeface="Arial"/>
-                <a:ea typeface="Arial"/>
-                <a:cs typeface="Arial"/>
-                <a:sym typeface="Arial"/>
-              </a:rPr>
-              <a:t>Get feedback and suggestions from users/players</a:t>
-            </a:r>
-          </a:p>
-          <a:p>
-            <a:pPr rtl="0" lvl="0">
-              <a:spcBef>
-                <a:spcPts val="0"/>
-              </a:spcBef>
-              <a:buClr>
-                <a:schemeClr val="dk1"/>
-              </a:buClr>
-              <a:buFont typeface="Arial"/>
-              <a:buNone/>
-            </a:pPr>
-            <a:r>
-              <a:t/>
-            </a:r>
-            <a:endParaRPr sz="1100" i="1">
-              <a:solidFill>
-                <a:schemeClr val="dk1"/>
-              </a:solidFill>
-            </a:endParaRPr>
-          </a:p>
-          <a:p>
-            <a:pPr>
-              <a:spcBef>
-                <a:spcPts val="0"/>
-              </a:spcBef>
-              <a:buNone/>
-            </a:pPr>
-            <a:r>
-              <a:t/>
-            </a:r>
-            <a:endParaRPr sz="1100"/>
           </a:p>
         </p:txBody>
       </p:sp>
+      <p:graphicFrame>
+        <p:nvGraphicFramePr>
+          <p:cNvPr id="104" name="Shape 104"/>
+          <p:cNvGraphicFramePr/>
+          <p:nvPr/>
+        </p:nvGraphicFramePr>
+        <p:xfrm>
+          <a:off y="1063362" x="457200"/>
+          <a:ext cy="3000000" cx="3000000"/>
+        </p:xfrm>
+        <a:graphic>
+          <a:graphicData uri="http://schemas.openxmlformats.org/drawingml/2006/table">
+            <a:tbl>
+              <a:tblPr>
+                <a:noFill/>
+                <a:tableStyleId>{50094CE3-59A0-419F-93D6-328162ED895A}</a:tableStyleId>
+              </a:tblPr>
+              <a:tblGrid>
+                <a:gridCol w="4774775"/>
+                <a:gridCol w="2164425"/>
+                <a:gridCol w="963425"/>
+              </a:tblGrid>
+              <a:tr h="417125">
+                <a:tc>
+                  <a:txBody>
+                    <a:bodyPr>
+                      <a:noAutofit/>
+                    </a:bodyPr>
+                    <a:lstStyle/>
+                    <a:p>
+                      <a:pPr rtl="0" lvl="0">
+                        <a:spcBef>
+                          <a:spcPts val="0"/>
+                        </a:spcBef>
+                        <a:buNone/>
+                      </a:pPr>
+                      <a:r>
+                        <a:rPr b="1" sz="1200" lang="en"/>
+                        <a:t>Sprint 3 (Release)</a:t>
+                      </a:r>
+                    </a:p>
+                  </a:txBody>
+                  <a:tcPr marR="66675" marB="66675" marT="66675" marL="66675">
+                    <a:lnL w="9525" cap="flat">
+                      <a:solidFill>
+                        <a:srgbClr val="000000"/>
+                      </a:solidFill>
+                      <a:prstDash val="solid"/>
+                      <a:round/>
+                      <a:headEnd w="med" len="med" type="none"/>
+                      <a:tailEnd w="med" len="med" type="none"/>
+                    </a:lnL>
+                    <a:lnR w="9525" cap="flat">
+                      <a:solidFill>
+                        <a:srgbClr val="000000"/>
+                      </a:solidFill>
+                      <a:prstDash val="solid"/>
+                      <a:round/>
+                      <a:headEnd w="med" len="med" type="none"/>
+                      <a:tailEnd w="med" len="med" type="none"/>
+                    </a:lnR>
+                    <a:lnT w="9525" cap="flat">
+                      <a:solidFill>
+                        <a:srgbClr val="000000"/>
+                      </a:solidFill>
+                      <a:prstDash val="solid"/>
+                      <a:round/>
+                      <a:headEnd w="med" len="med" type="none"/>
+                      <a:tailEnd w="med" len="med" type="none"/>
+                    </a:lnT>
+                    <a:lnB w="9525" cap="flat">
+                      <a:solidFill>
+                        <a:srgbClr val="000000"/>
+                      </a:solidFill>
+                      <a:prstDash val="solid"/>
+                      <a:round/>
+                      <a:headEnd w="med" len="med" type="none"/>
+                      <a:tailEnd w="med" len="med" type="none"/>
+                    </a:lnB>
+                  </a:tcPr>
+                </a:tc>
+                <a:tc>
+                  <a:txBody>
+                    <a:bodyPr>
+                      <a:noAutofit/>
+                    </a:bodyPr>
+                    <a:lstStyle/>
+                    <a:p>
+                      <a:pPr rtl="0" lvl="0">
+                        <a:spcBef>
+                          <a:spcPts val="0"/>
+                        </a:spcBef>
+                        <a:buNone/>
+                      </a:pPr>
+                      <a:r>
+                        <a:rPr b="1" sz="1200" lang="en"/>
+                        <a:t>High level Goal</a:t>
+                      </a:r>
+                    </a:p>
+                  </a:txBody>
+                  <a:tcPr marR="66675" marB="66675" marT="66675" marL="66675">
+                    <a:lnL w="9525" cap="flat">
+                      <a:solidFill>
+                        <a:srgbClr val="000000"/>
+                      </a:solidFill>
+                      <a:prstDash val="solid"/>
+                      <a:round/>
+                      <a:headEnd w="med" len="med" type="none"/>
+                      <a:tailEnd w="med" len="med" type="none"/>
+                    </a:lnL>
+                    <a:lnR w="9525" cap="flat">
+                      <a:solidFill>
+                        <a:srgbClr val="000000"/>
+                      </a:solidFill>
+                      <a:prstDash val="solid"/>
+                      <a:round/>
+                      <a:headEnd w="med" len="med" type="none"/>
+                      <a:tailEnd w="med" len="med" type="none"/>
+                    </a:lnR>
+                    <a:lnT w="9525" cap="flat">
+                      <a:solidFill>
+                        <a:srgbClr val="000000"/>
+                      </a:solidFill>
+                      <a:prstDash val="solid"/>
+                      <a:round/>
+                      <a:headEnd w="med" len="med" type="none"/>
+                      <a:tailEnd w="med" len="med" type="none"/>
+                    </a:lnT>
+                    <a:lnB w="9525" cap="flat">
+                      <a:solidFill>
+                        <a:srgbClr val="000000"/>
+                      </a:solidFill>
+                      <a:prstDash val="solid"/>
+                      <a:round/>
+                      <a:headEnd w="med" len="med" type="none"/>
+                      <a:tailEnd w="med" len="med" type="none"/>
+                    </a:lnB>
+                  </a:tcPr>
+                </a:tc>
+                <a:tc>
+                  <a:txBody>
+                    <a:bodyPr>
+                      <a:noAutofit/>
+                    </a:bodyPr>
+                    <a:lstStyle/>
+                    <a:p>
+                      <a:pPr rtl="0" lvl="0">
+                        <a:spcBef>
+                          <a:spcPts val="0"/>
+                        </a:spcBef>
+                        <a:buNone/>
+                      </a:pPr>
+                      <a:r>
+                        <a:rPr b="1" sz="1200" lang="en"/>
+                        <a:t>SP</a:t>
+                      </a:r>
+                    </a:p>
+                  </a:txBody>
+                  <a:tcPr marR="66675" marB="66675" marT="66675" marL="66675">
+                    <a:lnL w="9525" cap="flat">
+                      <a:solidFill>
+                        <a:srgbClr val="000000"/>
+                      </a:solidFill>
+                      <a:prstDash val="solid"/>
+                      <a:round/>
+                      <a:headEnd w="med" len="med" type="none"/>
+                      <a:tailEnd w="med" len="med" type="none"/>
+                    </a:lnL>
+                    <a:lnR w="9525" cap="flat">
+                      <a:solidFill>
+                        <a:srgbClr val="000000"/>
+                      </a:solidFill>
+                      <a:prstDash val="solid"/>
+                      <a:round/>
+                      <a:headEnd w="med" len="med" type="none"/>
+                      <a:tailEnd w="med" len="med" type="none"/>
+                    </a:lnR>
+                    <a:lnT w="9525" cap="flat">
+                      <a:solidFill>
+                        <a:srgbClr val="000000"/>
+                      </a:solidFill>
+                      <a:prstDash val="solid"/>
+                      <a:round/>
+                      <a:headEnd w="med" len="med" type="none"/>
+                      <a:tailEnd w="med" len="med" type="none"/>
+                    </a:lnT>
+                    <a:lnB w="9525" cap="flat">
+                      <a:solidFill>
+                        <a:srgbClr val="000000"/>
+                      </a:solidFill>
+                      <a:prstDash val="solid"/>
+                      <a:round/>
+                      <a:headEnd w="med" len="med" type="none"/>
+                      <a:tailEnd w="med" len="med" type="none"/>
+                    </a:lnB>
+                  </a:tcPr>
+                </a:tc>
+              </a:tr>
+              <a:tr h="447650">
+                <a:tc>
+                  <a:txBody>
+                    <a:bodyPr>
+                      <a:noAutofit/>
+                    </a:bodyPr>
+                    <a:lstStyle/>
+                    <a:p>
+                      <a:pPr rtl="0" lvl="0">
+                        <a:spcBef>
+                          <a:spcPts val="0"/>
+                        </a:spcBef>
+                        <a:buNone/>
+                      </a:pPr>
+                      <a:r>
+                        <a:rPr sz="1200" lang="en"/>
+                        <a:t>As a player I want a progression of levels, so I can learn how to play and be challenged as I progress.</a:t>
+                      </a:r>
+                    </a:p>
+                  </a:txBody>
+                  <a:tcPr marR="66675" marB="66675" marT="66675" marL="66675">
+                    <a:lnL w="9525" cap="flat">
+                      <a:solidFill>
+                        <a:srgbClr val="000000"/>
+                      </a:solidFill>
+                      <a:prstDash val="solid"/>
+                      <a:round/>
+                      <a:headEnd w="med" len="med" type="none"/>
+                      <a:tailEnd w="med" len="med" type="none"/>
+                    </a:lnL>
+                    <a:lnR w="9525" cap="flat">
+                      <a:solidFill>
+                        <a:srgbClr val="000000"/>
+                      </a:solidFill>
+                      <a:prstDash val="solid"/>
+                      <a:round/>
+                      <a:headEnd w="med" len="med" type="none"/>
+                      <a:tailEnd w="med" len="med" type="none"/>
+                    </a:lnR>
+                    <a:lnT w="9525" cap="flat">
+                      <a:solidFill>
+                        <a:srgbClr val="000000"/>
+                      </a:solidFill>
+                      <a:prstDash val="solid"/>
+                      <a:round/>
+                      <a:headEnd w="med" len="med" type="none"/>
+                      <a:tailEnd w="med" len="med" type="none"/>
+                    </a:lnT>
+                    <a:lnB w="9525" cap="flat">
+                      <a:solidFill>
+                        <a:srgbClr val="000000"/>
+                      </a:solidFill>
+                      <a:prstDash val="solid"/>
+                      <a:round/>
+                      <a:headEnd w="med" len="med" type="none"/>
+                      <a:tailEnd w="med" len="med" type="none"/>
+                    </a:lnB>
+                  </a:tcPr>
+                </a:tc>
+                <a:tc>
+                  <a:txBody>
+                    <a:bodyPr>
+                      <a:noAutofit/>
+                    </a:bodyPr>
+                    <a:lstStyle/>
+                    <a:p>
+                      <a:pPr rtl="0" lvl="0">
+                        <a:spcBef>
+                          <a:spcPts val="0"/>
+                        </a:spcBef>
+                        <a:buNone/>
+                      </a:pPr>
+                      <a:r>
+                        <a:rPr sz="1200" lang="en"/>
+                        <a:t>Level Progression</a:t>
+                      </a:r>
+                    </a:p>
+                  </a:txBody>
+                  <a:tcPr marR="66675" marB="66675" marT="66675" marL="66675">
+                    <a:lnL w="9525" cap="flat">
+                      <a:solidFill>
+                        <a:srgbClr val="000000"/>
+                      </a:solidFill>
+                      <a:prstDash val="solid"/>
+                      <a:round/>
+                      <a:headEnd w="med" len="med" type="none"/>
+                      <a:tailEnd w="med" len="med" type="none"/>
+                    </a:lnL>
+                    <a:lnR w="9525" cap="flat">
+                      <a:solidFill>
+                        <a:srgbClr val="000000"/>
+                      </a:solidFill>
+                      <a:prstDash val="solid"/>
+                      <a:round/>
+                      <a:headEnd w="med" len="med" type="none"/>
+                      <a:tailEnd w="med" len="med" type="none"/>
+                    </a:lnR>
+                    <a:lnT w="9525" cap="flat">
+                      <a:solidFill>
+                        <a:srgbClr val="000000"/>
+                      </a:solidFill>
+                      <a:prstDash val="solid"/>
+                      <a:round/>
+                      <a:headEnd w="med" len="med" type="none"/>
+                      <a:tailEnd w="med" len="med" type="none"/>
+                    </a:lnT>
+                    <a:lnB w="9525" cap="flat">
+                      <a:solidFill>
+                        <a:srgbClr val="000000"/>
+                      </a:solidFill>
+                      <a:prstDash val="solid"/>
+                      <a:round/>
+                      <a:headEnd w="med" len="med" type="none"/>
+                      <a:tailEnd w="med" len="med" type="none"/>
+                    </a:lnB>
+                  </a:tcPr>
+                </a:tc>
+                <a:tc>
+                  <a:txBody>
+                    <a:bodyPr>
+                      <a:noAutofit/>
+                    </a:bodyPr>
+                    <a:lstStyle/>
+                    <a:p>
+                      <a:pPr rtl="0" lvl="0">
+                        <a:spcBef>
+                          <a:spcPts val="0"/>
+                        </a:spcBef>
+                        <a:buNone/>
+                      </a:pPr>
+                      <a:r>
+                        <a:rPr sz="1200" lang="en"/>
+                        <a:t>5</a:t>
+                      </a:r>
+                    </a:p>
+                  </a:txBody>
+                  <a:tcPr marR="66675" marB="66675" marT="66675" marL="66675">
+                    <a:lnL w="9525" cap="flat">
+                      <a:solidFill>
+                        <a:srgbClr val="000000"/>
+                      </a:solidFill>
+                      <a:prstDash val="solid"/>
+                      <a:round/>
+                      <a:headEnd w="med" len="med" type="none"/>
+                      <a:tailEnd w="med" len="med" type="none"/>
+                    </a:lnL>
+                    <a:lnR w="9525" cap="flat">
+                      <a:solidFill>
+                        <a:srgbClr val="000000"/>
+                      </a:solidFill>
+                      <a:prstDash val="solid"/>
+                      <a:round/>
+                      <a:headEnd w="med" len="med" type="none"/>
+                      <a:tailEnd w="med" len="med" type="none"/>
+                    </a:lnR>
+                    <a:lnT w="9525" cap="flat">
+                      <a:solidFill>
+                        <a:srgbClr val="000000"/>
+                      </a:solidFill>
+                      <a:prstDash val="solid"/>
+                      <a:round/>
+                      <a:headEnd w="med" len="med" type="none"/>
+                      <a:tailEnd w="med" len="med" type="none"/>
+                    </a:lnT>
+                    <a:lnB w="9525" cap="flat">
+                      <a:solidFill>
+                        <a:srgbClr val="000000"/>
+                      </a:solidFill>
+                      <a:prstDash val="solid"/>
+                      <a:round/>
+                      <a:headEnd w="med" len="med" type="none"/>
+                      <a:tailEnd w="med" len="med" type="none"/>
+                    </a:lnB>
+                  </a:tcPr>
+                </a:tc>
+              </a:tr>
+              <a:tr h="499300">
+                <a:tc>
+                  <a:txBody>
+                    <a:bodyPr>
+                      <a:noAutofit/>
+                    </a:bodyPr>
+                    <a:lstStyle/>
+                    <a:p>
+                      <a:pPr rtl="0" lvl="0" marR="355600">
+                        <a:lnSpc>
+                          <a:spcPct val="115000"/>
+                        </a:lnSpc>
+                        <a:spcBef>
+                          <a:spcPts val="0"/>
+                        </a:spcBef>
+                        <a:buNone/>
+                      </a:pPr>
+                      <a:r>
+                        <a:rPr sz="1200" lang="en"/>
+                        <a:t>As a product owner, I want the release to be thoroughly tested, so I know it won’t crash on users</a:t>
+                      </a:r>
+                    </a:p>
+                  </a:txBody>
+                  <a:tcPr marR="66675" marB="66675" marT="66675" marL="66675">
+                    <a:lnL w="9525" cap="flat">
+                      <a:solidFill>
+                        <a:srgbClr val="000000"/>
+                      </a:solidFill>
+                      <a:prstDash val="solid"/>
+                      <a:round/>
+                      <a:headEnd w="med" len="med" type="none"/>
+                      <a:tailEnd w="med" len="med" type="none"/>
+                    </a:lnL>
+                    <a:lnR w="9525" cap="flat">
+                      <a:solidFill>
+                        <a:srgbClr val="000000"/>
+                      </a:solidFill>
+                      <a:prstDash val="solid"/>
+                      <a:round/>
+                      <a:headEnd w="med" len="med" type="none"/>
+                      <a:tailEnd w="med" len="med" type="none"/>
+                    </a:lnR>
+                    <a:lnT w="9525" cap="flat">
+                      <a:solidFill>
+                        <a:srgbClr val="000000"/>
+                      </a:solidFill>
+                      <a:prstDash val="solid"/>
+                      <a:round/>
+                      <a:headEnd w="med" len="med" type="none"/>
+                      <a:tailEnd w="med" len="med" type="none"/>
+                    </a:lnT>
+                    <a:lnB w="9525" cap="flat">
+                      <a:solidFill>
+                        <a:srgbClr val="000000"/>
+                      </a:solidFill>
+                      <a:prstDash val="solid"/>
+                      <a:round/>
+                      <a:headEnd w="med" len="med" type="none"/>
+                      <a:tailEnd w="med" len="med" type="none"/>
+                    </a:lnB>
+                  </a:tcPr>
+                </a:tc>
+                <a:tc>
+                  <a:txBody>
+                    <a:bodyPr>
+                      <a:noAutofit/>
+                    </a:bodyPr>
+                    <a:lstStyle/>
+                    <a:p>
+                      <a:pPr rtl="0" lvl="0" marR="355600">
+                        <a:lnSpc>
+                          <a:spcPct val="115000"/>
+                        </a:lnSpc>
+                        <a:spcBef>
+                          <a:spcPts val="0"/>
+                        </a:spcBef>
+                        <a:buNone/>
+                      </a:pPr>
+                      <a:r>
+                        <a:rPr sz="1200" lang="en"/>
+                        <a:t>Product Testing</a:t>
+                      </a:r>
+                    </a:p>
+                  </a:txBody>
+                  <a:tcPr marR="66675" marB="66675" marT="66675" marL="66675">
+                    <a:lnL w="9525" cap="flat">
+                      <a:solidFill>
+                        <a:srgbClr val="000000"/>
+                      </a:solidFill>
+                      <a:prstDash val="solid"/>
+                      <a:round/>
+                      <a:headEnd w="med" len="med" type="none"/>
+                      <a:tailEnd w="med" len="med" type="none"/>
+                    </a:lnL>
+                    <a:lnR w="9525" cap="flat">
+                      <a:solidFill>
+                        <a:srgbClr val="000000"/>
+                      </a:solidFill>
+                      <a:prstDash val="solid"/>
+                      <a:round/>
+                      <a:headEnd w="med" len="med" type="none"/>
+                      <a:tailEnd w="med" len="med" type="none"/>
+                    </a:lnR>
+                    <a:lnT w="9525" cap="flat">
+                      <a:solidFill>
+                        <a:srgbClr val="000000"/>
+                      </a:solidFill>
+                      <a:prstDash val="solid"/>
+                      <a:round/>
+                      <a:headEnd w="med" len="med" type="none"/>
+                      <a:tailEnd w="med" len="med" type="none"/>
+                    </a:lnT>
+                    <a:lnB w="9525" cap="flat">
+                      <a:solidFill>
+                        <a:srgbClr val="000000"/>
+                      </a:solidFill>
+                      <a:prstDash val="solid"/>
+                      <a:round/>
+                      <a:headEnd w="med" len="med" type="none"/>
+                      <a:tailEnd w="med" len="med" type="none"/>
+                    </a:lnB>
+                  </a:tcPr>
+                </a:tc>
+                <a:tc>
+                  <a:txBody>
+                    <a:bodyPr>
+                      <a:noAutofit/>
+                    </a:bodyPr>
+                    <a:lstStyle/>
+                    <a:p>
+                      <a:pPr rtl="0" lvl="0">
+                        <a:spcBef>
+                          <a:spcPts val="0"/>
+                        </a:spcBef>
+                        <a:buNone/>
+                      </a:pPr>
+                      <a:r>
+                        <a:rPr sz="1200" lang="en"/>
+                        <a:t>3</a:t>
+                      </a:r>
+                    </a:p>
+                  </a:txBody>
+                  <a:tcPr marR="66675" marB="66675" marT="66675" marL="66675">
+                    <a:lnL w="9525" cap="flat">
+                      <a:solidFill>
+                        <a:srgbClr val="000000"/>
+                      </a:solidFill>
+                      <a:prstDash val="solid"/>
+                      <a:round/>
+                      <a:headEnd w="med" len="med" type="none"/>
+                      <a:tailEnd w="med" len="med" type="none"/>
+                    </a:lnL>
+                    <a:lnR w="9525" cap="flat">
+                      <a:solidFill>
+                        <a:srgbClr val="000000"/>
+                      </a:solidFill>
+                      <a:prstDash val="solid"/>
+                      <a:round/>
+                      <a:headEnd w="med" len="med" type="none"/>
+                      <a:tailEnd w="med" len="med" type="none"/>
+                    </a:lnR>
+                    <a:lnT w="9525" cap="flat">
+                      <a:solidFill>
+                        <a:srgbClr val="000000"/>
+                      </a:solidFill>
+                      <a:prstDash val="solid"/>
+                      <a:round/>
+                      <a:headEnd w="med" len="med" type="none"/>
+                      <a:tailEnd w="med" len="med" type="none"/>
+                    </a:lnT>
+                    <a:lnB w="9525" cap="flat">
+                      <a:solidFill>
+                        <a:srgbClr val="000000"/>
+                      </a:solidFill>
+                      <a:prstDash val="solid"/>
+                      <a:round/>
+                      <a:headEnd w="med" len="med" type="none"/>
+                      <a:tailEnd w="med" len="med" type="none"/>
+                    </a:lnB>
+                  </a:tcPr>
+                </a:tc>
+              </a:tr>
+              <a:tr h="382100">
+                <a:tc>
+                  <a:txBody>
+                    <a:bodyPr>
+                      <a:noAutofit/>
+                    </a:bodyPr>
+                    <a:lstStyle/>
+                    <a:p>
+                      <a:pPr rtl="0" lvl="0">
+                        <a:spcBef>
+                          <a:spcPts val="0"/>
+                        </a:spcBef>
+                        <a:buNone/>
+                      </a:pPr>
+                      <a:r>
+                        <a:rPr sz="1200" lang="en"/>
+                        <a:t>As a player, I want to save my game state, so I can return to it later.</a:t>
+                      </a:r>
+                    </a:p>
+                  </a:txBody>
+                  <a:tcPr marR="66675" marB="66675" marT="66675" marL="66675">
+                    <a:lnL w="9525" cap="flat">
+                      <a:solidFill>
+                        <a:srgbClr val="000000"/>
+                      </a:solidFill>
+                      <a:prstDash val="solid"/>
+                      <a:round/>
+                      <a:headEnd w="med" len="med" type="none"/>
+                      <a:tailEnd w="med" len="med" type="none"/>
+                    </a:lnL>
+                    <a:lnR w="9525" cap="flat">
+                      <a:solidFill>
+                        <a:srgbClr val="000000"/>
+                      </a:solidFill>
+                      <a:prstDash val="solid"/>
+                      <a:round/>
+                      <a:headEnd w="med" len="med" type="none"/>
+                      <a:tailEnd w="med" len="med" type="none"/>
+                    </a:lnR>
+                    <a:lnT w="9525" cap="flat">
+                      <a:solidFill>
+                        <a:srgbClr val="000000"/>
+                      </a:solidFill>
+                      <a:prstDash val="solid"/>
+                      <a:round/>
+                      <a:headEnd w="med" len="med" type="none"/>
+                      <a:tailEnd w="med" len="med" type="none"/>
+                    </a:lnT>
+                    <a:lnB w="9525" cap="flat">
+                      <a:solidFill>
+                        <a:srgbClr val="000000"/>
+                      </a:solidFill>
+                      <a:prstDash val="solid"/>
+                      <a:round/>
+                      <a:headEnd w="med" len="med" type="none"/>
+                      <a:tailEnd w="med" len="med" type="none"/>
+                    </a:lnB>
+                  </a:tcPr>
+                </a:tc>
+                <a:tc>
+                  <a:txBody>
+                    <a:bodyPr>
+                      <a:noAutofit/>
+                    </a:bodyPr>
+                    <a:lstStyle/>
+                    <a:p>
+                      <a:pPr rtl="0" lvl="0">
+                        <a:spcBef>
+                          <a:spcPts val="0"/>
+                        </a:spcBef>
+                        <a:buNone/>
+                      </a:pPr>
+                      <a:r>
+                        <a:rPr sz="1200" lang="en"/>
+                        <a:t>Level Progression</a:t>
+                      </a:r>
+                    </a:p>
+                  </a:txBody>
+                  <a:tcPr marR="66675" marB="66675" marT="66675" marL="66675">
+                    <a:lnL w="9525" cap="flat">
+                      <a:solidFill>
+                        <a:srgbClr val="000000"/>
+                      </a:solidFill>
+                      <a:prstDash val="solid"/>
+                      <a:round/>
+                      <a:headEnd w="med" len="med" type="none"/>
+                      <a:tailEnd w="med" len="med" type="none"/>
+                    </a:lnL>
+                    <a:lnR w="9525" cap="flat">
+                      <a:solidFill>
+                        <a:srgbClr val="000000"/>
+                      </a:solidFill>
+                      <a:prstDash val="solid"/>
+                      <a:round/>
+                      <a:headEnd w="med" len="med" type="none"/>
+                      <a:tailEnd w="med" len="med" type="none"/>
+                    </a:lnR>
+                    <a:lnT w="9525" cap="flat">
+                      <a:solidFill>
+                        <a:srgbClr val="000000"/>
+                      </a:solidFill>
+                      <a:prstDash val="solid"/>
+                      <a:round/>
+                      <a:headEnd w="med" len="med" type="none"/>
+                      <a:tailEnd w="med" len="med" type="none"/>
+                    </a:lnT>
+                    <a:lnB w="9525" cap="flat">
+                      <a:solidFill>
+                        <a:srgbClr val="000000"/>
+                      </a:solidFill>
+                      <a:prstDash val="solid"/>
+                      <a:round/>
+                      <a:headEnd w="med" len="med" type="none"/>
+                      <a:tailEnd w="med" len="med" type="none"/>
+                    </a:lnB>
+                  </a:tcPr>
+                </a:tc>
+                <a:tc>
+                  <a:txBody>
+                    <a:bodyPr>
+                      <a:noAutofit/>
+                    </a:bodyPr>
+                    <a:lstStyle/>
+                    <a:p>
+                      <a:pPr rtl="0" lvl="0">
+                        <a:spcBef>
+                          <a:spcPts val="0"/>
+                        </a:spcBef>
+                        <a:buNone/>
+                      </a:pPr>
+                      <a:r>
+                        <a:rPr sz="1200" lang="en"/>
+                        <a:t>2</a:t>
+                      </a:r>
+                    </a:p>
+                  </a:txBody>
+                  <a:tcPr marR="66675" marB="66675" marT="66675" marL="66675">
+                    <a:lnL w="9525" cap="flat">
+                      <a:solidFill>
+                        <a:srgbClr val="000000"/>
+                      </a:solidFill>
+                      <a:prstDash val="solid"/>
+                      <a:round/>
+                      <a:headEnd w="med" len="med" type="none"/>
+                      <a:tailEnd w="med" len="med" type="none"/>
+                    </a:lnL>
+                    <a:lnR w="9525" cap="flat">
+                      <a:solidFill>
+                        <a:srgbClr val="000000"/>
+                      </a:solidFill>
+                      <a:prstDash val="solid"/>
+                      <a:round/>
+                      <a:headEnd w="med" len="med" type="none"/>
+                      <a:tailEnd w="med" len="med" type="none"/>
+                    </a:lnR>
+                    <a:lnT w="9525" cap="flat">
+                      <a:solidFill>
+                        <a:srgbClr val="000000"/>
+                      </a:solidFill>
+                      <a:prstDash val="solid"/>
+                      <a:round/>
+                      <a:headEnd w="med" len="med" type="none"/>
+                      <a:tailEnd w="med" len="med" type="none"/>
+                    </a:lnT>
+                    <a:lnB w="9525" cap="flat">
+                      <a:solidFill>
+                        <a:srgbClr val="000000"/>
+                      </a:solidFill>
+                      <a:prstDash val="solid"/>
+                      <a:round/>
+                      <a:headEnd w="med" len="med" type="none"/>
+                      <a:tailEnd w="med" len="med" type="none"/>
+                    </a:lnB>
+                  </a:tcPr>
+                </a:tc>
+              </a:tr>
+              <a:tr h="447650">
+                <a:tc>
+                  <a:txBody>
+                    <a:bodyPr>
+                      <a:noAutofit/>
+                    </a:bodyPr>
+                    <a:lstStyle/>
+                    <a:p>
+                      <a:pPr rtl="0" lvl="0">
+                        <a:spcBef>
+                          <a:spcPts val="0"/>
+                        </a:spcBef>
+                        <a:buNone/>
+                      </a:pPr>
+                      <a:r>
+                        <a:rPr sz="1200" lang="en"/>
+                        <a:t>As a player, I want to see how well I did on a level, so I can try to improve and compete with friends.</a:t>
+                      </a:r>
+                    </a:p>
+                  </a:txBody>
+                  <a:tcPr marR="66675" marB="66675" marT="66675" marL="66675">
+                    <a:lnL w="9525" cap="flat">
+                      <a:solidFill>
+                        <a:srgbClr val="000000"/>
+                      </a:solidFill>
+                      <a:prstDash val="solid"/>
+                      <a:round/>
+                      <a:headEnd w="med" len="med" type="none"/>
+                      <a:tailEnd w="med" len="med" type="none"/>
+                    </a:lnL>
+                    <a:lnR w="9525" cap="flat">
+                      <a:solidFill>
+                        <a:srgbClr val="000000"/>
+                      </a:solidFill>
+                      <a:prstDash val="solid"/>
+                      <a:round/>
+                      <a:headEnd w="med" len="med" type="none"/>
+                      <a:tailEnd w="med" len="med" type="none"/>
+                    </a:lnR>
+                    <a:lnT w="9525" cap="flat">
+                      <a:solidFill>
+                        <a:srgbClr val="000000"/>
+                      </a:solidFill>
+                      <a:prstDash val="solid"/>
+                      <a:round/>
+                      <a:headEnd w="med" len="med" type="none"/>
+                      <a:tailEnd w="med" len="med" type="none"/>
+                    </a:lnT>
+                    <a:lnB w="9525" cap="flat">
+                      <a:solidFill>
+                        <a:srgbClr val="000000"/>
+                      </a:solidFill>
+                      <a:prstDash val="solid"/>
+                      <a:round/>
+                      <a:headEnd w="med" len="med" type="none"/>
+                      <a:tailEnd w="med" len="med" type="none"/>
+                    </a:lnB>
+                  </a:tcPr>
+                </a:tc>
+                <a:tc>
+                  <a:txBody>
+                    <a:bodyPr>
+                      <a:noAutofit/>
+                    </a:bodyPr>
+                    <a:lstStyle/>
+                    <a:p>
+                      <a:pPr rtl="0" lvl="0">
+                        <a:spcBef>
+                          <a:spcPts val="0"/>
+                        </a:spcBef>
+                        <a:buNone/>
+                      </a:pPr>
+                      <a:r>
+                        <a:rPr sz="1200" lang="en"/>
+                        <a:t>Score System</a:t>
+                      </a:r>
+                    </a:p>
+                  </a:txBody>
+                  <a:tcPr marR="66675" marB="66675" marT="66675" marL="66675">
+                    <a:lnL w="9525" cap="flat">
+                      <a:solidFill>
+                        <a:srgbClr val="000000"/>
+                      </a:solidFill>
+                      <a:prstDash val="solid"/>
+                      <a:round/>
+                      <a:headEnd w="med" len="med" type="none"/>
+                      <a:tailEnd w="med" len="med" type="none"/>
+                    </a:lnL>
+                    <a:lnR w="9525" cap="flat">
+                      <a:solidFill>
+                        <a:srgbClr val="000000"/>
+                      </a:solidFill>
+                      <a:prstDash val="solid"/>
+                      <a:round/>
+                      <a:headEnd w="med" len="med" type="none"/>
+                      <a:tailEnd w="med" len="med" type="none"/>
+                    </a:lnR>
+                    <a:lnT w="9525" cap="flat">
+                      <a:solidFill>
+                        <a:srgbClr val="000000"/>
+                      </a:solidFill>
+                      <a:prstDash val="solid"/>
+                      <a:round/>
+                      <a:headEnd w="med" len="med" type="none"/>
+                      <a:tailEnd w="med" len="med" type="none"/>
+                    </a:lnT>
+                    <a:lnB w="9525" cap="flat">
+                      <a:solidFill>
+                        <a:srgbClr val="000000"/>
+                      </a:solidFill>
+                      <a:prstDash val="solid"/>
+                      <a:round/>
+                      <a:headEnd w="med" len="med" type="none"/>
+                      <a:tailEnd w="med" len="med" type="none"/>
+                    </a:lnB>
+                  </a:tcPr>
+                </a:tc>
+                <a:tc>
+                  <a:txBody>
+                    <a:bodyPr>
+                      <a:noAutofit/>
+                    </a:bodyPr>
+                    <a:lstStyle/>
+                    <a:p>
+                      <a:pPr rtl="0" lvl="0">
+                        <a:spcBef>
+                          <a:spcPts val="0"/>
+                        </a:spcBef>
+                        <a:buNone/>
+                      </a:pPr>
+                      <a:r>
+                        <a:rPr sz="1200" lang="en"/>
+                        <a:t>2</a:t>
+                      </a:r>
+                    </a:p>
+                  </a:txBody>
+                  <a:tcPr marR="66675" marB="66675" marT="66675" marL="66675">
+                    <a:lnL w="9525" cap="flat">
+                      <a:solidFill>
+                        <a:srgbClr val="000000"/>
+                      </a:solidFill>
+                      <a:prstDash val="solid"/>
+                      <a:round/>
+                      <a:headEnd w="med" len="med" type="none"/>
+                      <a:tailEnd w="med" len="med" type="none"/>
+                    </a:lnL>
+                    <a:lnR w="9525" cap="flat">
+                      <a:solidFill>
+                        <a:srgbClr val="000000"/>
+                      </a:solidFill>
+                      <a:prstDash val="solid"/>
+                      <a:round/>
+                      <a:headEnd w="med" len="med" type="none"/>
+                      <a:tailEnd w="med" len="med" type="none"/>
+                    </a:lnR>
+                    <a:lnT w="9525" cap="flat">
+                      <a:solidFill>
+                        <a:srgbClr val="000000"/>
+                      </a:solidFill>
+                      <a:prstDash val="solid"/>
+                      <a:round/>
+                      <a:headEnd w="med" len="med" type="none"/>
+                      <a:tailEnd w="med" len="med" type="none"/>
+                    </a:lnT>
+                    <a:lnB w="9525" cap="flat">
+                      <a:solidFill>
+                        <a:srgbClr val="000000"/>
+                      </a:solidFill>
+                      <a:prstDash val="solid"/>
+                      <a:round/>
+                      <a:headEnd w="med" len="med" type="none"/>
+                      <a:tailEnd w="med" len="med" type="none"/>
+                    </a:lnB>
+                  </a:tcPr>
+                </a:tc>
+              </a:tr>
+              <a:tr h="447650">
+                <a:tc>
+                  <a:txBody>
+                    <a:bodyPr>
+                      <a:noAutofit/>
+                    </a:bodyPr>
+                    <a:lstStyle/>
+                    <a:p>
+                      <a:pPr rtl="0" lvl="0">
+                        <a:spcBef>
+                          <a:spcPts val="0"/>
+                        </a:spcBef>
+                        <a:buNone/>
+                      </a:pPr>
+                      <a:r>
+                        <a:rPr sz="1200" lang="en"/>
+                        <a:t>As a product owner, I want a credits screen, so the development team can let people know they made the game.</a:t>
+                      </a:r>
+                    </a:p>
+                  </a:txBody>
+                  <a:tcPr marR="66675" marB="66675" marT="66675" marL="66675">
+                    <a:lnL w="9525" cap="flat">
+                      <a:solidFill>
+                        <a:srgbClr val="000000"/>
+                      </a:solidFill>
+                      <a:prstDash val="solid"/>
+                      <a:round/>
+                      <a:headEnd w="med" len="med" type="none"/>
+                      <a:tailEnd w="med" len="med" type="none"/>
+                    </a:lnL>
+                    <a:lnR w="9525" cap="flat">
+                      <a:solidFill>
+                        <a:srgbClr val="000000"/>
+                      </a:solidFill>
+                      <a:prstDash val="solid"/>
+                      <a:round/>
+                      <a:headEnd w="med" len="med" type="none"/>
+                      <a:tailEnd w="med" len="med" type="none"/>
+                    </a:lnR>
+                    <a:lnT w="9525" cap="flat">
+                      <a:solidFill>
+                        <a:srgbClr val="000000"/>
+                      </a:solidFill>
+                      <a:prstDash val="solid"/>
+                      <a:round/>
+                      <a:headEnd w="med" len="med" type="none"/>
+                      <a:tailEnd w="med" len="med" type="none"/>
+                    </a:lnT>
+                    <a:lnB w="9525" cap="flat">
+                      <a:solidFill>
+                        <a:srgbClr val="000000"/>
+                      </a:solidFill>
+                      <a:prstDash val="solid"/>
+                      <a:round/>
+                      <a:headEnd w="med" len="med" type="none"/>
+                      <a:tailEnd w="med" len="med" type="none"/>
+                    </a:lnB>
+                  </a:tcPr>
+                </a:tc>
+                <a:tc>
+                  <a:txBody>
+                    <a:bodyPr>
+                      <a:noAutofit/>
+                    </a:bodyPr>
+                    <a:lstStyle/>
+                    <a:p>
+                      <a:pPr rtl="0" lvl="0">
+                        <a:spcBef>
+                          <a:spcPts val="0"/>
+                        </a:spcBef>
+                        <a:buNone/>
+                      </a:pPr>
+                      <a:r>
+                        <a:rPr sz="1200" lang="en"/>
+                        <a:t>Credits Screen</a:t>
+                      </a:r>
+                    </a:p>
+                  </a:txBody>
+                  <a:tcPr marR="66675" marB="66675" marT="66675" marL="66675">
+                    <a:lnL w="9525" cap="flat">
+                      <a:solidFill>
+                        <a:srgbClr val="000000"/>
+                      </a:solidFill>
+                      <a:prstDash val="solid"/>
+                      <a:round/>
+                      <a:headEnd w="med" len="med" type="none"/>
+                      <a:tailEnd w="med" len="med" type="none"/>
+                    </a:lnL>
+                    <a:lnR w="9525" cap="flat">
+                      <a:solidFill>
+                        <a:srgbClr val="000000"/>
+                      </a:solidFill>
+                      <a:prstDash val="solid"/>
+                      <a:round/>
+                      <a:headEnd w="med" len="med" type="none"/>
+                      <a:tailEnd w="med" len="med" type="none"/>
+                    </a:lnR>
+                    <a:lnT w="9525" cap="flat">
+                      <a:solidFill>
+                        <a:srgbClr val="000000"/>
+                      </a:solidFill>
+                      <a:prstDash val="solid"/>
+                      <a:round/>
+                      <a:headEnd w="med" len="med" type="none"/>
+                      <a:tailEnd w="med" len="med" type="none"/>
+                    </a:lnT>
+                    <a:lnB w="9525" cap="flat">
+                      <a:solidFill>
+                        <a:srgbClr val="000000"/>
+                      </a:solidFill>
+                      <a:prstDash val="solid"/>
+                      <a:round/>
+                      <a:headEnd w="med" len="med" type="none"/>
+                      <a:tailEnd w="med" len="med" type="none"/>
+                    </a:lnB>
+                  </a:tcPr>
+                </a:tc>
+                <a:tc>
+                  <a:txBody>
+                    <a:bodyPr>
+                      <a:noAutofit/>
+                    </a:bodyPr>
+                    <a:lstStyle/>
+                    <a:p>
+                      <a:pPr rtl="0" lvl="0">
+                        <a:spcBef>
+                          <a:spcPts val="0"/>
+                        </a:spcBef>
+                        <a:buNone/>
+                      </a:pPr>
+                      <a:r>
+                        <a:rPr sz="1200" lang="en"/>
+                        <a:t>2</a:t>
+                      </a:r>
+                    </a:p>
+                  </a:txBody>
+                  <a:tcPr marR="66675" marB="66675" marT="66675" marL="66675">
+                    <a:lnL w="9525" cap="flat">
+                      <a:solidFill>
+                        <a:srgbClr val="000000"/>
+                      </a:solidFill>
+                      <a:prstDash val="solid"/>
+                      <a:round/>
+                      <a:headEnd w="med" len="med" type="none"/>
+                      <a:tailEnd w="med" len="med" type="none"/>
+                    </a:lnL>
+                    <a:lnR w="9525" cap="flat">
+                      <a:solidFill>
+                        <a:srgbClr val="000000"/>
+                      </a:solidFill>
+                      <a:prstDash val="solid"/>
+                      <a:round/>
+                      <a:headEnd w="med" len="med" type="none"/>
+                      <a:tailEnd w="med" len="med" type="none"/>
+                    </a:lnR>
+                    <a:lnT w="9525" cap="flat">
+                      <a:solidFill>
+                        <a:srgbClr val="000000"/>
+                      </a:solidFill>
+                      <a:prstDash val="solid"/>
+                      <a:round/>
+                      <a:headEnd w="med" len="med" type="none"/>
+                      <a:tailEnd w="med" len="med" type="none"/>
+                    </a:lnT>
+                    <a:lnB w="9525" cap="flat">
+                      <a:solidFill>
+                        <a:srgbClr val="000000"/>
+                      </a:solidFill>
+                      <a:prstDash val="solid"/>
+                      <a:round/>
+                      <a:headEnd w="med" len="med" type="none"/>
+                      <a:tailEnd w="med" len="med" type="none"/>
+                    </a:lnB>
+                  </a:tcPr>
+                </a:tc>
+              </a:tr>
+              <a:tr h="499300">
+                <a:tc>
+                  <a:txBody>
+                    <a:bodyPr>
+                      <a:noAutofit/>
+                    </a:bodyPr>
+                    <a:lstStyle/>
+                    <a:p>
+                      <a:pPr rtl="0" lvl="0" marR="355600">
+                        <a:lnSpc>
+                          <a:spcPct val="115000"/>
+                        </a:lnSpc>
+                        <a:spcBef>
+                          <a:spcPts val="0"/>
+                        </a:spcBef>
+                        <a:buNone/>
+                      </a:pPr>
+                      <a:r>
+                        <a:rPr sz="1200" lang="en"/>
+                        <a:t>As a player, I want the game to look and sound good, so I can enjoy it more.</a:t>
+                      </a:r>
+                    </a:p>
+                  </a:txBody>
+                  <a:tcPr marR="66675" marB="66675" marT="66675" marL="66675">
+                    <a:lnL w="9525" cap="flat">
+                      <a:solidFill>
+                        <a:srgbClr val="000000"/>
+                      </a:solidFill>
+                      <a:prstDash val="solid"/>
+                      <a:round/>
+                      <a:headEnd w="med" len="med" type="none"/>
+                      <a:tailEnd w="med" len="med" type="none"/>
+                    </a:lnL>
+                    <a:lnR w="9525" cap="flat">
+                      <a:solidFill>
+                        <a:srgbClr val="000000"/>
+                      </a:solidFill>
+                      <a:prstDash val="solid"/>
+                      <a:round/>
+                      <a:headEnd w="med" len="med" type="none"/>
+                      <a:tailEnd w="med" len="med" type="none"/>
+                    </a:lnR>
+                    <a:lnT w="9525" cap="flat">
+                      <a:solidFill>
+                        <a:srgbClr val="000000"/>
+                      </a:solidFill>
+                      <a:prstDash val="solid"/>
+                      <a:round/>
+                      <a:headEnd w="med" len="med" type="none"/>
+                      <a:tailEnd w="med" len="med" type="none"/>
+                    </a:lnT>
+                    <a:lnB w="9525" cap="flat">
+                      <a:solidFill>
+                        <a:srgbClr val="000000"/>
+                      </a:solidFill>
+                      <a:prstDash val="solid"/>
+                      <a:round/>
+                      <a:headEnd w="med" len="med" type="none"/>
+                      <a:tailEnd w="med" len="med" type="none"/>
+                    </a:lnB>
+                  </a:tcPr>
+                </a:tc>
+                <a:tc>
+                  <a:txBody>
+                    <a:bodyPr>
+                      <a:noAutofit/>
+                    </a:bodyPr>
+                    <a:lstStyle/>
+                    <a:p>
+                      <a:pPr rtl="0" lvl="0">
+                        <a:spcBef>
+                          <a:spcPts val="0"/>
+                        </a:spcBef>
+                        <a:buNone/>
+                      </a:pPr>
+                      <a:r>
+                        <a:rPr sz="1200" lang="en"/>
+                        <a:t>Art, Audio, Animations</a:t>
+                      </a:r>
+                    </a:p>
+                  </a:txBody>
+                  <a:tcPr marR="66675" marB="66675" marT="66675" marL="66675">
+                    <a:lnL w="9525" cap="flat">
+                      <a:solidFill>
+                        <a:srgbClr val="000000"/>
+                      </a:solidFill>
+                      <a:prstDash val="solid"/>
+                      <a:round/>
+                      <a:headEnd w="med" len="med" type="none"/>
+                      <a:tailEnd w="med" len="med" type="none"/>
+                    </a:lnL>
+                    <a:lnR w="9525" cap="flat">
+                      <a:solidFill>
+                        <a:srgbClr val="000000"/>
+                      </a:solidFill>
+                      <a:prstDash val="solid"/>
+                      <a:round/>
+                      <a:headEnd w="med" len="med" type="none"/>
+                      <a:tailEnd w="med" len="med" type="none"/>
+                    </a:lnR>
+                    <a:lnT w="9525" cap="flat">
+                      <a:solidFill>
+                        <a:srgbClr val="000000"/>
+                      </a:solidFill>
+                      <a:prstDash val="solid"/>
+                      <a:round/>
+                      <a:headEnd w="med" len="med" type="none"/>
+                      <a:tailEnd w="med" len="med" type="none"/>
+                    </a:lnT>
+                    <a:lnB w="9525" cap="flat">
+                      <a:solidFill>
+                        <a:srgbClr val="000000"/>
+                      </a:solidFill>
+                      <a:prstDash val="solid"/>
+                      <a:round/>
+                      <a:headEnd w="med" len="med" type="none"/>
+                      <a:tailEnd w="med" len="med" type="none"/>
+                    </a:lnB>
+                  </a:tcPr>
+                </a:tc>
+                <a:tc>
+                  <a:txBody>
+                    <a:bodyPr>
+                      <a:noAutofit/>
+                    </a:bodyPr>
+                    <a:lstStyle/>
+                    <a:p>
+                      <a:pPr rtl="0" lvl="0">
+                        <a:spcBef>
+                          <a:spcPts val="0"/>
+                        </a:spcBef>
+                        <a:buNone/>
+                      </a:pPr>
+                      <a:r>
+                        <a:rPr sz="1200" lang="en"/>
+                        <a:t>8</a:t>
+                      </a:r>
+                    </a:p>
+                  </a:txBody>
+                  <a:tcPr marR="66675" marB="66675" marT="66675" marL="66675">
+                    <a:lnL w="9525" cap="flat">
+                      <a:solidFill>
+                        <a:srgbClr val="000000"/>
+                      </a:solidFill>
+                      <a:prstDash val="solid"/>
+                      <a:round/>
+                      <a:headEnd w="med" len="med" type="none"/>
+                      <a:tailEnd w="med" len="med" type="none"/>
+                    </a:lnL>
+                    <a:lnR w="9525" cap="flat">
+                      <a:solidFill>
+                        <a:srgbClr val="000000"/>
+                      </a:solidFill>
+                      <a:prstDash val="solid"/>
+                      <a:round/>
+                      <a:headEnd w="med" len="med" type="none"/>
+                      <a:tailEnd w="med" len="med" type="none"/>
+                    </a:lnR>
+                    <a:lnT w="9525" cap="flat">
+                      <a:solidFill>
+                        <a:srgbClr val="000000"/>
+                      </a:solidFill>
+                      <a:prstDash val="solid"/>
+                      <a:round/>
+                      <a:headEnd w="med" len="med" type="none"/>
+                      <a:tailEnd w="med" len="med" type="none"/>
+                    </a:lnT>
+                    <a:lnB w="9525" cap="flat">
+                      <a:solidFill>
+                        <a:srgbClr val="000000"/>
+                      </a:solidFill>
+                      <a:prstDash val="solid"/>
+                      <a:round/>
+                      <a:headEnd w="med" len="med" type="none"/>
+                      <a:tailEnd w="med" len="med" type="none"/>
+                    </a:lnB>
+                  </a:tcPr>
+                </a:tc>
+              </a:tr>
+              <a:tr h="499300">
+                <a:tc>
+                  <a:txBody>
+                    <a:bodyPr>
+                      <a:noAutofit/>
+                    </a:bodyPr>
+                    <a:lstStyle/>
+                    <a:p>
+                      <a:pPr rtl="0" lvl="0" marR="355600">
+                        <a:lnSpc>
+                          <a:spcPct val="115000"/>
+                        </a:lnSpc>
+                        <a:spcBef>
+                          <a:spcPts val="0"/>
+                        </a:spcBef>
+                        <a:buNone/>
+                      </a:pPr>
+                      <a:r>
+                        <a:rPr sz="1200" lang="en"/>
+                        <a:t>As a player, I want a responsive game, so I don’t become frustrated and lose interest.</a:t>
+                      </a:r>
+                    </a:p>
+                  </a:txBody>
+                  <a:tcPr marR="66675" marB="66675" marT="66675" marL="66675">
+                    <a:lnL w="9525" cap="flat">
+                      <a:solidFill>
+                        <a:srgbClr val="000000"/>
+                      </a:solidFill>
+                      <a:prstDash val="solid"/>
+                      <a:round/>
+                      <a:headEnd w="med" len="med" type="none"/>
+                      <a:tailEnd w="med" len="med" type="none"/>
+                    </a:lnL>
+                    <a:lnR w="9525" cap="flat">
+                      <a:solidFill>
+                        <a:srgbClr val="000000"/>
+                      </a:solidFill>
+                      <a:prstDash val="solid"/>
+                      <a:round/>
+                      <a:headEnd w="med" len="med" type="none"/>
+                      <a:tailEnd w="med" len="med" type="none"/>
+                    </a:lnR>
+                    <a:lnT w="9525" cap="flat">
+                      <a:solidFill>
+                        <a:srgbClr val="000000"/>
+                      </a:solidFill>
+                      <a:prstDash val="solid"/>
+                      <a:round/>
+                      <a:headEnd w="med" len="med" type="none"/>
+                      <a:tailEnd w="med" len="med" type="none"/>
+                    </a:lnT>
+                    <a:lnB w="9525" cap="flat">
+                      <a:solidFill>
+                        <a:srgbClr val="000000"/>
+                      </a:solidFill>
+                      <a:prstDash val="solid"/>
+                      <a:round/>
+                      <a:headEnd w="med" len="med" type="none"/>
+                      <a:tailEnd w="med" len="med" type="none"/>
+                    </a:lnB>
+                  </a:tcPr>
+                </a:tc>
+                <a:tc>
+                  <a:txBody>
+                    <a:bodyPr>
+                      <a:noAutofit/>
+                    </a:bodyPr>
+                    <a:lstStyle/>
+                    <a:p>
+                      <a:pPr rtl="0" lvl="0">
+                        <a:spcBef>
+                          <a:spcPts val="0"/>
+                        </a:spcBef>
+                        <a:buNone/>
+                      </a:pPr>
+                      <a:r>
+                        <a:rPr sz="1200" lang="en"/>
+                        <a:t>Optimization</a:t>
+                      </a:r>
+                    </a:p>
+                  </a:txBody>
+                  <a:tcPr marR="66675" marB="66675" marT="66675" marL="66675">
+                    <a:lnL w="9525" cap="flat">
+                      <a:solidFill>
+                        <a:srgbClr val="000000"/>
+                      </a:solidFill>
+                      <a:prstDash val="solid"/>
+                      <a:round/>
+                      <a:headEnd w="med" len="med" type="none"/>
+                      <a:tailEnd w="med" len="med" type="none"/>
+                    </a:lnL>
+                    <a:lnR w="9525" cap="flat">
+                      <a:solidFill>
+                        <a:srgbClr val="000000"/>
+                      </a:solidFill>
+                      <a:prstDash val="solid"/>
+                      <a:round/>
+                      <a:headEnd w="med" len="med" type="none"/>
+                      <a:tailEnd w="med" len="med" type="none"/>
+                    </a:lnR>
+                    <a:lnT w="9525" cap="flat">
+                      <a:solidFill>
+                        <a:srgbClr val="000000"/>
+                      </a:solidFill>
+                      <a:prstDash val="solid"/>
+                      <a:round/>
+                      <a:headEnd w="med" len="med" type="none"/>
+                      <a:tailEnd w="med" len="med" type="none"/>
+                    </a:lnT>
+                    <a:lnB w="9525" cap="flat">
+                      <a:solidFill>
+                        <a:srgbClr val="000000"/>
+                      </a:solidFill>
+                      <a:prstDash val="solid"/>
+                      <a:round/>
+                      <a:headEnd w="med" len="med" type="none"/>
+                      <a:tailEnd w="med" len="med" type="none"/>
+                    </a:lnB>
+                  </a:tcPr>
+                </a:tc>
+                <a:tc>
+                  <a:txBody>
+                    <a:bodyPr>
+                      <a:noAutofit/>
+                    </a:bodyPr>
+                    <a:lstStyle/>
+                    <a:p>
+                      <a:pPr rtl="0" lvl="0">
+                        <a:spcBef>
+                          <a:spcPts val="0"/>
+                        </a:spcBef>
+                        <a:buNone/>
+                      </a:pPr>
+                      <a:r>
+                        <a:rPr sz="1200" lang="en"/>
+                        <a:t>1</a:t>
+                      </a:r>
+                    </a:p>
+                  </a:txBody>
+                  <a:tcPr marR="66675" marB="66675" marT="66675" marL="66675">
+                    <a:lnL w="9525" cap="flat">
+                      <a:solidFill>
+                        <a:srgbClr val="000000"/>
+                      </a:solidFill>
+                      <a:prstDash val="solid"/>
+                      <a:round/>
+                      <a:headEnd w="med" len="med" type="none"/>
+                      <a:tailEnd w="med" len="med" type="none"/>
+                    </a:lnL>
+                    <a:lnR w="9525" cap="flat">
+                      <a:solidFill>
+                        <a:srgbClr val="000000"/>
+                      </a:solidFill>
+                      <a:prstDash val="solid"/>
+                      <a:round/>
+                      <a:headEnd w="med" len="med" type="none"/>
+                      <a:tailEnd w="med" len="med" type="none"/>
+                    </a:lnR>
+                    <a:lnT w="9525" cap="flat">
+                      <a:solidFill>
+                        <a:srgbClr val="000000"/>
+                      </a:solidFill>
+                      <a:prstDash val="solid"/>
+                      <a:round/>
+                      <a:headEnd w="med" len="med" type="none"/>
+                      <a:tailEnd w="med" len="med" type="none"/>
+                    </a:lnT>
+                    <a:lnB w="9525" cap="flat">
+                      <a:solidFill>
+                        <a:srgbClr val="000000"/>
+                      </a:solidFill>
+                      <a:prstDash val="solid"/>
+                      <a:round/>
+                      <a:headEnd w="med" len="med" type="none"/>
+                      <a:tailEnd w="med" len="med" type="none"/>
+                    </a:lnB>
+                  </a:tcPr>
+                </a:tc>
+              </a:tr>
+            </a:tbl>
+          </a:graphicData>
+        </a:graphic>
+      </p:graphicFrame>
     </p:spTree>
   </p:cSld>
   <p:clrMapOvr>
@@ -6344,9 +8526,9 @@
 </file>
 
 <file path=ppt/theme/theme1.xml><?xml version="1.0" encoding="utf-8"?>
-<a:theme xmlns:a="http://schemas.openxmlformats.org/drawingml/2006/main" xmlns:r="http://schemas.openxmlformats.org/officeDocument/2006/relationships" name="Custom Theme">
+<a:theme xmlns:a="http://schemas.openxmlformats.org/drawingml/2006/main" xmlns:r="http://schemas.openxmlformats.org/officeDocument/2006/relationships" name="spotlight">
   <a:themeElements>
-    <a:clrScheme name="Default">
+    <a:clrScheme name="Custom 439">
       <a:dk1>
         <a:srgbClr val="000000"/>
       </a:dk1>
@@ -6354,34 +8536,34 @@
         <a:srgbClr val="FFFFFF"/>
       </a:lt1>
       <a:dk2>
-        <a:srgbClr val="158158"/>
+        <a:srgbClr val="5C6E95"/>
       </a:dk2>
       <a:lt2>
-        <a:srgbClr val="F3F3F3"/>
+        <a:srgbClr val="ACB4C2"/>
       </a:lt2>
       <a:accent1>
-        <a:srgbClr val="058DC7"/>
+        <a:srgbClr val="667E50"/>
       </a:accent1>
       <a:accent2>
-        <a:srgbClr val="50B432"/>
+        <a:srgbClr val="CFBF73"/>
       </a:accent2>
       <a:accent3>
-        <a:srgbClr val="ED561B"/>
+        <a:srgbClr val="8C7C82"/>
       </a:accent3>
       <a:accent4>
-        <a:srgbClr val="EDEF00"/>
+        <a:srgbClr val="9ABF87"/>
       </a:accent4>
       <a:accent5>
-        <a:srgbClr val="24CBE5"/>
+        <a:srgbClr val="CF9462"/>
       </a:accent5>
       <a:accent6>
-        <a:srgbClr val="64E572"/>
+        <a:srgbClr val="A25642"/>
       </a:accent6>
       <a:hlink>
-        <a:srgbClr val="2200CC"/>
+        <a:srgbClr val="5173A5"/>
       </a:hlink>
       <a:folHlink>
-        <a:srgbClr val="551A8B"/>
+        <a:srgbClr val="687282"/>
       </a:folHlink>
     </a:clrScheme>
     <a:fontScheme name="Office">
@@ -6938,9 +9120,9 @@
 </file>
 
 <file path=ppt/theme/theme3.xml><?xml version="1.0" encoding="utf-8"?>
-<a:theme xmlns:a="http://schemas.openxmlformats.org/drawingml/2006/main" xmlns:r="http://schemas.openxmlformats.org/officeDocument/2006/relationships" name="spotlight">
+<a:theme xmlns:a="http://schemas.openxmlformats.org/drawingml/2006/main" xmlns:r="http://schemas.openxmlformats.org/officeDocument/2006/relationships" name="Custom Theme">
   <a:themeElements>
-    <a:clrScheme name="Custom 439">
+    <a:clrScheme name="Default">
       <a:dk1>
         <a:srgbClr val="000000"/>
       </a:dk1>
@@ -6948,34 +9130,34 @@
         <a:srgbClr val="FFFFFF"/>
       </a:lt1>
       <a:dk2>
-        <a:srgbClr val="5C6E95"/>
+        <a:srgbClr val="158158"/>
       </a:dk2>
       <a:lt2>
-        <a:srgbClr val="ACB4C2"/>
+        <a:srgbClr val="F3F3F3"/>
       </a:lt2>
       <a:accent1>
-        <a:srgbClr val="667E50"/>
+        <a:srgbClr val="058DC7"/>
       </a:accent1>
       <a:accent2>
-        <a:srgbClr val="CFBF73"/>
+        <a:srgbClr val="50B432"/>
       </a:accent2>
       <a:accent3>
-        <a:srgbClr val="8C7C82"/>
+        <a:srgbClr val="ED561B"/>
       </a:accent3>
       <a:accent4>
-        <a:srgbClr val="9ABF87"/>
+        <a:srgbClr val="EDEF00"/>
       </a:accent4>
       <a:accent5>
-        <a:srgbClr val="CF9462"/>
+        <a:srgbClr val="24CBE5"/>
       </a:accent5>
       <a:accent6>
-        <a:srgbClr val="A25642"/>
+        <a:srgbClr val="64E572"/>
       </a:accent6>
       <a:hlink>
-        <a:srgbClr val="5173A5"/>
+        <a:srgbClr val="2200CC"/>
       </a:hlink>
       <a:folHlink>
-        <a:srgbClr val="687282"/>
+        <a:srgbClr val="551A8B"/>
       </a:folHlink>
     </a:clrScheme>
     <a:fontScheme name="Office">

</xml_diff>